<commit_message>
feat: add activity and intent pptx
</commit_message>
<xml_diff>
--- a/android views 2.pptx
+++ b/android views 2.pptx
@@ -5,9 +5,9 @@
     <p:sldMasterId id="2147483648" r:id="rId1"/>
   </p:sldMasterIdLst>
   <p:sldIdLst>
-    <p:sldId id="256" r:id="rId2"/>
-    <p:sldId id="257" r:id="rId3"/>
-    <p:sldId id="278" r:id="rId4"/>
+    <p:sldId id="278" r:id="rId2"/>
+    <p:sldId id="256" r:id="rId3"/>
+    <p:sldId id="257" r:id="rId4"/>
     <p:sldId id="279" r:id="rId5"/>
     <p:sldId id="280" r:id="rId6"/>
     <p:sldId id="281" r:id="rId7"/>
@@ -289,7 +289,7 @@
           <a:p>
             <a:fld id="{D997B5FA-0921-464F-AAE1-844C04324D75}" type="datetimeFigureOut">
               <a:rPr lang="zh-CN" altLang="en-US" smtClean="0"/>
-              <a:t>2020/10/23</a:t>
+              <a:t>2020/10/27</a:t>
             </a:fld>
             <a:endParaRPr lang="zh-CN" altLang="en-US"/>
           </a:p>
@@ -457,7 +457,7 @@
           <a:p>
             <a:fld id="{D997B5FA-0921-464F-AAE1-844C04324D75}" type="datetimeFigureOut">
               <a:rPr lang="zh-CN" altLang="en-US" smtClean="0"/>
-              <a:t>2020/10/23</a:t>
+              <a:t>2020/10/27</a:t>
             </a:fld>
             <a:endParaRPr lang="zh-CN" altLang="en-US"/>
           </a:p>
@@ -635,7 +635,7 @@
           <a:p>
             <a:fld id="{D997B5FA-0921-464F-AAE1-844C04324D75}" type="datetimeFigureOut">
               <a:rPr lang="zh-CN" altLang="en-US" smtClean="0"/>
-              <a:t>2020/10/23</a:t>
+              <a:t>2020/10/27</a:t>
             </a:fld>
             <a:endParaRPr lang="zh-CN" altLang="en-US"/>
           </a:p>
@@ -803,7 +803,7 @@
           <a:p>
             <a:fld id="{D997B5FA-0921-464F-AAE1-844C04324D75}" type="datetimeFigureOut">
               <a:rPr lang="zh-CN" altLang="en-US" smtClean="0"/>
-              <a:t>2020/10/23</a:t>
+              <a:t>2020/10/27</a:t>
             </a:fld>
             <a:endParaRPr lang="zh-CN" altLang="en-US"/>
           </a:p>
@@ -1048,7 +1048,7 @@
           <a:p>
             <a:fld id="{D997B5FA-0921-464F-AAE1-844C04324D75}" type="datetimeFigureOut">
               <a:rPr lang="zh-CN" altLang="en-US" smtClean="0"/>
-              <a:t>2020/10/23</a:t>
+              <a:t>2020/10/27</a:t>
             </a:fld>
             <a:endParaRPr lang="zh-CN" altLang="en-US"/>
           </a:p>
@@ -1277,7 +1277,7 @@
           <a:p>
             <a:fld id="{D997B5FA-0921-464F-AAE1-844C04324D75}" type="datetimeFigureOut">
               <a:rPr lang="zh-CN" altLang="en-US" smtClean="0"/>
-              <a:t>2020/10/23</a:t>
+              <a:t>2020/10/27</a:t>
             </a:fld>
             <a:endParaRPr lang="zh-CN" altLang="en-US"/>
           </a:p>
@@ -1641,7 +1641,7 @@
           <a:p>
             <a:fld id="{D997B5FA-0921-464F-AAE1-844C04324D75}" type="datetimeFigureOut">
               <a:rPr lang="zh-CN" altLang="en-US" smtClean="0"/>
-              <a:t>2020/10/23</a:t>
+              <a:t>2020/10/27</a:t>
             </a:fld>
             <a:endParaRPr lang="zh-CN" altLang="en-US"/>
           </a:p>
@@ -1758,7 +1758,7 @@
           <a:p>
             <a:fld id="{D997B5FA-0921-464F-AAE1-844C04324D75}" type="datetimeFigureOut">
               <a:rPr lang="zh-CN" altLang="en-US" smtClean="0"/>
-              <a:t>2020/10/23</a:t>
+              <a:t>2020/10/27</a:t>
             </a:fld>
             <a:endParaRPr lang="zh-CN" altLang="en-US"/>
           </a:p>
@@ -1853,7 +1853,7 @@
           <a:p>
             <a:fld id="{D997B5FA-0921-464F-AAE1-844C04324D75}" type="datetimeFigureOut">
               <a:rPr lang="zh-CN" altLang="en-US" smtClean="0"/>
-              <a:t>2020/10/23</a:t>
+              <a:t>2020/10/27</a:t>
             </a:fld>
             <a:endParaRPr lang="zh-CN" altLang="en-US"/>
           </a:p>
@@ -2128,7 +2128,7 @@
           <a:p>
             <a:fld id="{D997B5FA-0921-464F-AAE1-844C04324D75}" type="datetimeFigureOut">
               <a:rPr lang="zh-CN" altLang="en-US" smtClean="0"/>
-              <a:t>2020/10/23</a:t>
+              <a:t>2020/10/27</a:t>
             </a:fld>
             <a:endParaRPr lang="zh-CN" altLang="en-US"/>
           </a:p>
@@ -2380,7 +2380,7 @@
           <a:p>
             <a:fld id="{D997B5FA-0921-464F-AAE1-844C04324D75}" type="datetimeFigureOut">
               <a:rPr lang="zh-CN" altLang="en-US" smtClean="0"/>
-              <a:t>2020/10/23</a:t>
+              <a:t>2020/10/27</a:t>
             </a:fld>
             <a:endParaRPr lang="zh-CN" altLang="en-US"/>
           </a:p>
@@ -2591,7 +2591,7 @@
           <a:p>
             <a:fld id="{D997B5FA-0921-464F-AAE1-844C04324D75}" type="datetimeFigureOut">
               <a:rPr lang="zh-CN" altLang="en-US" smtClean="0"/>
-              <a:t>2020/10/23</a:t>
+              <a:t>2020/10/27</a:t>
             </a:fld>
             <a:endParaRPr lang="zh-CN" altLang="en-US"/>
           </a:p>
@@ -2998,66 +2998,1088 @@
       </p:grpSpPr>
       <p:sp>
         <p:nvSpPr>
-          <p:cNvPr id="2" name="标题 1">
+          <p:cNvPr id="4" name="Rectangle 1">
             <a:extLst>
               <a:ext uri="{FF2B5EF4-FFF2-40B4-BE49-F238E27FC236}">
-                <a16:creationId xmlns:a16="http://schemas.microsoft.com/office/drawing/2014/main" id="{6FB0C5A2-2772-4B65-A3DD-C2C6B6983B24}"/>
+                <a16:creationId xmlns:a16="http://schemas.microsoft.com/office/drawing/2014/main" id="{3931581E-B33F-4E7E-B734-819C7EA60716}"/>
               </a:ext>
             </a:extLst>
           </p:cNvPr>
           <p:cNvSpPr>
-            <a:spLocks noGrp="1"/>
+            <a:spLocks noGrp="1" noChangeArrowheads="1"/>
           </p:cNvSpPr>
           <p:nvPr>
-            <p:ph type="ctrTitle"/>
+            <p:ph idx="1"/>
           </p:nvPr>
         </p:nvSpPr>
-        <p:spPr/>
+        <p:spPr bwMode="auto">
+          <a:xfrm>
+            <a:off x="433431" y="500885"/>
+            <a:ext cx="11325138" cy="6186309"/>
+          </a:xfrm>
+          <a:prstGeom prst="rect">
+            <a:avLst/>
+          </a:prstGeom>
+          <a:solidFill>
+            <a:srgbClr val="FFFFFF"/>
+          </a:solidFill>
+          <a:ln>
+            <a:noFill/>
+          </a:ln>
+          <a:effectLst/>
+          <a:extLst>
+            <a:ext uri="{91240B29-F687-4F45-9708-019B960494DF}">
+              <a14:hiddenLine xmlns:a14="http://schemas.microsoft.com/office/drawing/2010/main" w="9525">
+                <a:solidFill>
+                  <a:schemeClr val="tx1"/>
+                </a:solidFill>
+                <a:miter lim="800000"/>
+                <a:headEnd/>
+                <a:tailEnd/>
+              </a14:hiddenLine>
+            </a:ext>
+            <a:ext uri="{AF507438-7753-43E0-B8FC-AC1667EBCBE1}">
+              <a14:hiddenEffects xmlns:a14="http://schemas.microsoft.com/office/drawing/2010/main">
+                <a:effectLst>
+                  <a:outerShdw dist="35921" dir="2700000" algn="ctr" rotWithShape="0">
+                    <a:schemeClr val="bg2"/>
+                  </a:outerShdw>
+                </a:effectLst>
+              </a14:hiddenEffects>
+            </a:ext>
+          </a:extLst>
+        </p:spPr>
         <p:txBody>
-          <a:bodyPr/>
+          <a:bodyPr vert="horz" wrap="square" lIns="91440" tIns="45720" rIns="91440" bIns="45720" numCol="1" anchor="ctr" anchorCtr="0" compatLnSpc="1">
+            <a:prstTxWarp prst="textNoShape">
+              <a:avLst/>
+            </a:prstTxWarp>
+            <a:spAutoFit/>
+          </a:bodyPr>
           <a:lstStyle/>
           <a:p>
-            <a:r>
-              <a:rPr lang="zh-CN" altLang="en-US" dirty="0"/>
-              <a:t>安卓基本组件</a:t>
-            </a:r>
-            <a:r>
-              <a:rPr lang="en-US" altLang="zh-CN" dirty="0"/>
-              <a:t>2</a:t>
-            </a:r>
-            <a:endParaRPr lang="zh-CN" altLang="en-US" dirty="0"/>
+            <a:pPr marL="0" marR="0" lvl="0" indent="0" algn="l" defTabSz="914400" rtl="0" eaLnBrk="0" fontAlgn="base" latinLnBrk="0" hangingPunct="0">
+              <a:lnSpc>
+                <a:spcPct val="100000"/>
+              </a:lnSpc>
+              <a:spcBef>
+                <a:spcPct val="0"/>
+              </a:spcBef>
+              <a:spcAft>
+                <a:spcPct val="0"/>
+              </a:spcAft>
+              <a:buClrTx/>
+              <a:buSzTx/>
+              <a:buFontTx/>
+              <a:buNone/>
+              <a:tabLst/>
+            </a:pPr>
+            <a:r>
+              <a:rPr kumimoji="0" lang="zh-CN" altLang="zh-CN" sz="1800" b="1" i="0" u="none" strike="noStrike" cap="none" normalizeH="0" baseline="0" dirty="0">
+                <a:ln>
+                  <a:noFill/>
+                </a:ln>
+                <a:solidFill>
+                  <a:srgbClr val="000080"/>
+                </a:solidFill>
+                <a:effectLst/>
+                <a:latin typeface="Consolas" panose="020B0609020204030204" pitchFamily="49" charset="0"/>
+              </a:rPr>
+              <a:t>public class </a:t>
+            </a:r>
+            <a:r>
+              <a:rPr kumimoji="0" lang="zh-CN" altLang="zh-CN" sz="1800" b="0" i="0" u="none" strike="noStrike" cap="none" normalizeH="0" baseline="0" dirty="0">
+                <a:ln>
+                  <a:noFill/>
+                </a:ln>
+                <a:solidFill>
+                  <a:srgbClr val="000000"/>
+                </a:solidFill>
+                <a:effectLst/>
+                <a:latin typeface="Consolas" panose="020B0609020204030204" pitchFamily="49" charset="0"/>
+              </a:rPr>
+              <a:t>MainActivity </a:t>
+            </a:r>
+            <a:r>
+              <a:rPr kumimoji="0" lang="zh-CN" altLang="zh-CN" sz="1800" b="1" i="0" u="none" strike="noStrike" cap="none" normalizeH="0" baseline="0" dirty="0">
+                <a:ln>
+                  <a:noFill/>
+                </a:ln>
+                <a:solidFill>
+                  <a:srgbClr val="000080"/>
+                </a:solidFill>
+                <a:effectLst/>
+                <a:latin typeface="Consolas" panose="020B0609020204030204" pitchFamily="49" charset="0"/>
+              </a:rPr>
+              <a:t>extends </a:t>
+            </a:r>
+            <a:r>
+              <a:rPr kumimoji="0" lang="zh-CN" altLang="zh-CN" sz="1800" b="0" i="0" u="none" strike="noStrike" cap="none" normalizeH="0" baseline="0" dirty="0">
+                <a:ln>
+                  <a:noFill/>
+                </a:ln>
+                <a:solidFill>
+                  <a:srgbClr val="000000"/>
+                </a:solidFill>
+                <a:effectLst/>
+                <a:latin typeface="Consolas" panose="020B0609020204030204" pitchFamily="49" charset="0"/>
+              </a:rPr>
+              <a:t>AppCompatActivity {</a:t>
+            </a:r>
+            <a:br>
+              <a:rPr kumimoji="0" lang="zh-CN" altLang="zh-CN" sz="1800" b="0" i="0" u="none" strike="noStrike" cap="none" normalizeH="0" baseline="0" dirty="0">
+                <a:ln>
+                  <a:noFill/>
+                </a:ln>
+                <a:solidFill>
+                  <a:srgbClr val="000000"/>
+                </a:solidFill>
+                <a:effectLst/>
+                <a:latin typeface="Consolas" panose="020B0609020204030204" pitchFamily="49" charset="0"/>
+              </a:rPr>
+            </a:br>
+            <a:r>
+              <a:rPr kumimoji="0" lang="zh-CN" altLang="zh-CN" sz="1800" b="0" i="0" u="none" strike="noStrike" cap="none" normalizeH="0" baseline="0" dirty="0">
+                <a:ln>
+                  <a:noFill/>
+                </a:ln>
+                <a:solidFill>
+                  <a:srgbClr val="000000"/>
+                </a:solidFill>
+                <a:effectLst/>
+                <a:latin typeface="Consolas" panose="020B0609020204030204" pitchFamily="49" charset="0"/>
+              </a:rPr>
+              <a:t>    </a:t>
+            </a:r>
+            <a:r>
+              <a:rPr kumimoji="0" lang="zh-CN" altLang="zh-CN" sz="1800" b="0" i="0" u="none" strike="noStrike" cap="none" normalizeH="0" baseline="0" dirty="0">
+                <a:ln>
+                  <a:noFill/>
+                </a:ln>
+                <a:solidFill>
+                  <a:srgbClr val="808000"/>
+                </a:solidFill>
+                <a:effectLst/>
+                <a:latin typeface="Consolas" panose="020B0609020204030204" pitchFamily="49" charset="0"/>
+              </a:rPr>
+              <a:t>@Override</a:t>
+            </a:r>
+            <a:br>
+              <a:rPr kumimoji="0" lang="zh-CN" altLang="zh-CN" sz="1800" b="0" i="0" u="none" strike="noStrike" cap="none" normalizeH="0" baseline="0" dirty="0">
+                <a:ln>
+                  <a:noFill/>
+                </a:ln>
+                <a:solidFill>
+                  <a:srgbClr val="808000"/>
+                </a:solidFill>
+                <a:effectLst/>
+                <a:latin typeface="Consolas" panose="020B0609020204030204" pitchFamily="49" charset="0"/>
+              </a:rPr>
+            </a:br>
+            <a:r>
+              <a:rPr kumimoji="0" lang="zh-CN" altLang="zh-CN" sz="1800" b="0" i="0" u="none" strike="noStrike" cap="none" normalizeH="0" baseline="0" dirty="0">
+                <a:ln>
+                  <a:noFill/>
+                </a:ln>
+                <a:solidFill>
+                  <a:srgbClr val="808000"/>
+                </a:solidFill>
+                <a:effectLst/>
+                <a:latin typeface="Consolas" panose="020B0609020204030204" pitchFamily="49" charset="0"/>
+              </a:rPr>
+              <a:t>    </a:t>
+            </a:r>
+            <a:r>
+              <a:rPr kumimoji="0" lang="zh-CN" altLang="zh-CN" sz="1800" b="1" i="0" u="none" strike="noStrike" cap="none" normalizeH="0" baseline="0" dirty="0">
+                <a:ln>
+                  <a:noFill/>
+                </a:ln>
+                <a:solidFill>
+                  <a:srgbClr val="000080"/>
+                </a:solidFill>
+                <a:effectLst/>
+                <a:latin typeface="Consolas" panose="020B0609020204030204" pitchFamily="49" charset="0"/>
+              </a:rPr>
+              <a:t>protected void </a:t>
+            </a:r>
+            <a:r>
+              <a:rPr kumimoji="0" lang="zh-CN" altLang="zh-CN" sz="1800" b="0" i="0" u="none" strike="noStrike" cap="none" normalizeH="0" baseline="0" dirty="0">
+                <a:ln>
+                  <a:noFill/>
+                </a:ln>
+                <a:solidFill>
+                  <a:srgbClr val="000000"/>
+                </a:solidFill>
+                <a:effectLst/>
+                <a:latin typeface="Consolas" panose="020B0609020204030204" pitchFamily="49" charset="0"/>
+              </a:rPr>
+              <a:t>onCreate(Bundle savedInstanceState)</a:t>
+            </a:r>
+            <a:br>
+              <a:rPr kumimoji="0" lang="zh-CN" altLang="zh-CN" sz="1800" b="0" i="0" u="none" strike="noStrike" cap="none" normalizeH="0" baseline="0" dirty="0">
+                <a:ln>
+                  <a:noFill/>
+                </a:ln>
+                <a:solidFill>
+                  <a:srgbClr val="000000"/>
+                </a:solidFill>
+                <a:effectLst/>
+                <a:latin typeface="Consolas" panose="020B0609020204030204" pitchFamily="49" charset="0"/>
+              </a:rPr>
+            </a:br>
+            <a:r>
+              <a:rPr kumimoji="0" lang="zh-CN" altLang="zh-CN" sz="1800" b="0" i="0" u="none" strike="noStrike" cap="none" normalizeH="0" baseline="0" dirty="0">
+                <a:ln>
+                  <a:noFill/>
+                </a:ln>
+                <a:solidFill>
+                  <a:srgbClr val="000000"/>
+                </a:solidFill>
+                <a:effectLst/>
+                <a:latin typeface="Consolas" panose="020B0609020204030204" pitchFamily="49" charset="0"/>
+              </a:rPr>
+              <a:t>    {</a:t>
+            </a:r>
+            <a:br>
+              <a:rPr kumimoji="0" lang="zh-CN" altLang="zh-CN" sz="1800" b="0" i="0" u="none" strike="noStrike" cap="none" normalizeH="0" baseline="0" dirty="0">
+                <a:ln>
+                  <a:noFill/>
+                </a:ln>
+                <a:solidFill>
+                  <a:srgbClr val="000000"/>
+                </a:solidFill>
+                <a:effectLst/>
+                <a:latin typeface="Consolas" panose="020B0609020204030204" pitchFamily="49" charset="0"/>
+              </a:rPr>
+            </a:br>
+            <a:r>
+              <a:rPr kumimoji="0" lang="zh-CN" altLang="zh-CN" sz="1800" b="0" i="0" u="none" strike="noStrike" cap="none" normalizeH="0" baseline="0" dirty="0">
+                <a:ln>
+                  <a:noFill/>
+                </a:ln>
+                <a:solidFill>
+                  <a:srgbClr val="000000"/>
+                </a:solidFill>
+                <a:effectLst/>
+                <a:latin typeface="Consolas" panose="020B0609020204030204" pitchFamily="49" charset="0"/>
+              </a:rPr>
+              <a:t>        </a:t>
+            </a:r>
+            <a:r>
+              <a:rPr kumimoji="0" lang="zh-CN" altLang="zh-CN" sz="1800" b="1" i="0" u="none" strike="noStrike" cap="none" normalizeH="0" baseline="0" dirty="0">
+                <a:ln>
+                  <a:noFill/>
+                </a:ln>
+                <a:solidFill>
+                  <a:srgbClr val="000080"/>
+                </a:solidFill>
+                <a:effectLst/>
+                <a:latin typeface="Consolas" panose="020B0609020204030204" pitchFamily="49" charset="0"/>
+              </a:rPr>
+              <a:t>super</a:t>
+            </a:r>
+            <a:r>
+              <a:rPr kumimoji="0" lang="zh-CN" altLang="zh-CN" sz="1800" b="0" i="0" u="none" strike="noStrike" cap="none" normalizeH="0" baseline="0" dirty="0">
+                <a:ln>
+                  <a:noFill/>
+                </a:ln>
+                <a:solidFill>
+                  <a:srgbClr val="000000"/>
+                </a:solidFill>
+                <a:effectLst/>
+                <a:latin typeface="Consolas" panose="020B0609020204030204" pitchFamily="49" charset="0"/>
+              </a:rPr>
+              <a:t>.onCreate(savedInstanceState);</a:t>
+            </a:r>
+            <a:br>
+              <a:rPr kumimoji="0" lang="zh-CN" altLang="zh-CN" sz="1800" b="0" i="0" u="none" strike="noStrike" cap="none" normalizeH="0" baseline="0" dirty="0">
+                <a:ln>
+                  <a:noFill/>
+                </a:ln>
+                <a:solidFill>
+                  <a:srgbClr val="000000"/>
+                </a:solidFill>
+                <a:effectLst/>
+                <a:latin typeface="Consolas" panose="020B0609020204030204" pitchFamily="49" charset="0"/>
+              </a:rPr>
+            </a:br>
+            <a:r>
+              <a:rPr kumimoji="0" lang="zh-CN" altLang="zh-CN" sz="1800" b="0" i="0" u="none" strike="noStrike" cap="none" normalizeH="0" baseline="0" dirty="0">
+                <a:ln>
+                  <a:noFill/>
+                </a:ln>
+                <a:solidFill>
+                  <a:srgbClr val="000000"/>
+                </a:solidFill>
+                <a:effectLst/>
+                <a:latin typeface="Consolas" panose="020B0609020204030204" pitchFamily="49" charset="0"/>
+              </a:rPr>
+              <a:t>        setContentView(R.layout.</a:t>
+            </a:r>
+            <a:r>
+              <a:rPr kumimoji="0" lang="zh-CN" altLang="zh-CN" sz="1800" b="1" i="1" u="none" strike="noStrike" cap="none" normalizeH="0" baseline="0" dirty="0">
+                <a:ln>
+                  <a:noFill/>
+                </a:ln>
+                <a:solidFill>
+                  <a:srgbClr val="660E7A"/>
+                </a:solidFill>
+                <a:effectLst/>
+                <a:latin typeface="Consolas" panose="020B0609020204030204" pitchFamily="49" charset="0"/>
+              </a:rPr>
+              <a:t>activity_main</a:t>
+            </a:r>
+            <a:r>
+              <a:rPr kumimoji="0" lang="zh-CN" altLang="zh-CN" sz="1800" b="0" i="0" u="none" strike="noStrike" cap="none" normalizeH="0" baseline="0" dirty="0">
+                <a:ln>
+                  <a:noFill/>
+                </a:ln>
+                <a:solidFill>
+                  <a:srgbClr val="000000"/>
+                </a:solidFill>
+                <a:effectLst/>
+                <a:latin typeface="Consolas" panose="020B0609020204030204" pitchFamily="49" charset="0"/>
+              </a:rPr>
+              <a:t>);</a:t>
+            </a:r>
+            <a:br>
+              <a:rPr kumimoji="0" lang="zh-CN" altLang="zh-CN" sz="1800" b="0" i="0" u="none" strike="noStrike" cap="none" normalizeH="0" baseline="0" dirty="0">
+                <a:ln>
+                  <a:noFill/>
+                </a:ln>
+                <a:solidFill>
+                  <a:srgbClr val="000000"/>
+                </a:solidFill>
+                <a:effectLst/>
+                <a:latin typeface="Consolas" panose="020B0609020204030204" pitchFamily="49" charset="0"/>
+              </a:rPr>
+            </a:br>
+            <a:r>
+              <a:rPr kumimoji="0" lang="zh-CN" altLang="zh-CN" sz="1800" b="0" i="0" u="none" strike="noStrike" cap="none" normalizeH="0" baseline="0" dirty="0">
+                <a:ln>
+                  <a:noFill/>
+                </a:ln>
+                <a:solidFill>
+                  <a:srgbClr val="000000"/>
+                </a:solidFill>
+                <a:effectLst/>
+                <a:latin typeface="Consolas" panose="020B0609020204030204" pitchFamily="49" charset="0"/>
+              </a:rPr>
+              <a:t>        Button button = (Button) findViewById(R.id.</a:t>
+            </a:r>
+            <a:r>
+              <a:rPr kumimoji="0" lang="zh-CN" altLang="zh-CN" sz="1800" b="1" i="1" u="none" strike="noStrike" cap="none" normalizeH="0" baseline="0" dirty="0">
+                <a:ln>
+                  <a:noFill/>
+                </a:ln>
+                <a:solidFill>
+                  <a:srgbClr val="660E7A"/>
+                </a:solidFill>
+                <a:effectLst/>
+                <a:latin typeface="Consolas" panose="020B0609020204030204" pitchFamily="49" charset="0"/>
+              </a:rPr>
+              <a:t>button</a:t>
+            </a:r>
+            <a:r>
+              <a:rPr kumimoji="0" lang="zh-CN" altLang="zh-CN" sz="1800" b="0" i="0" u="none" strike="noStrike" cap="none" normalizeH="0" baseline="0" dirty="0">
+                <a:ln>
+                  <a:noFill/>
+                </a:ln>
+                <a:solidFill>
+                  <a:srgbClr val="000000"/>
+                </a:solidFill>
+                <a:effectLst/>
+                <a:latin typeface="Consolas" panose="020B0609020204030204" pitchFamily="49" charset="0"/>
+              </a:rPr>
+              <a:t>);</a:t>
+            </a:r>
+            <a:br>
+              <a:rPr kumimoji="0" lang="zh-CN" altLang="zh-CN" sz="1800" b="0" i="0" u="none" strike="noStrike" cap="none" normalizeH="0" baseline="0" dirty="0">
+                <a:ln>
+                  <a:noFill/>
+                </a:ln>
+                <a:solidFill>
+                  <a:srgbClr val="000000"/>
+                </a:solidFill>
+                <a:effectLst/>
+                <a:latin typeface="Consolas" panose="020B0609020204030204" pitchFamily="49" charset="0"/>
+              </a:rPr>
+            </a:br>
+            <a:r>
+              <a:rPr kumimoji="0" lang="zh-CN" altLang="zh-CN" sz="1800" b="0" i="0" u="none" strike="noStrike" cap="none" normalizeH="0" baseline="0" dirty="0">
+                <a:ln>
+                  <a:noFill/>
+                </a:ln>
+                <a:solidFill>
+                  <a:srgbClr val="000000"/>
+                </a:solidFill>
+                <a:effectLst/>
+                <a:latin typeface="Consolas" panose="020B0609020204030204" pitchFamily="49" charset="0"/>
+              </a:rPr>
+              <a:t>        button.setOnClickListener(</a:t>
+            </a:r>
+            <a:r>
+              <a:rPr kumimoji="0" lang="zh-CN" altLang="zh-CN" sz="1800" b="1" i="0" u="none" strike="noStrike" cap="none" normalizeH="0" baseline="0" dirty="0">
+                <a:ln>
+                  <a:noFill/>
+                </a:ln>
+                <a:solidFill>
+                  <a:srgbClr val="000080"/>
+                </a:solidFill>
+                <a:effectLst/>
+                <a:latin typeface="Consolas" panose="020B0609020204030204" pitchFamily="49" charset="0"/>
+              </a:rPr>
+              <a:t>new </a:t>
+            </a:r>
+            <a:r>
+              <a:rPr kumimoji="0" lang="zh-CN" altLang="zh-CN" sz="1800" b="0" i="0" u="none" strike="noStrike" cap="none" normalizeH="0" baseline="0" dirty="0">
+                <a:ln>
+                  <a:noFill/>
+                </a:ln>
+                <a:solidFill>
+                  <a:srgbClr val="000000"/>
+                </a:solidFill>
+                <a:effectLst/>
+                <a:latin typeface="Consolas" panose="020B0609020204030204" pitchFamily="49" charset="0"/>
+              </a:rPr>
+              <a:t>LabelClickListener());  </a:t>
+            </a:r>
+            <a:r>
+              <a:rPr kumimoji="0" lang="zh-CN" altLang="zh-CN" sz="1800" b="0" i="1" u="none" strike="noStrike" cap="none" normalizeH="0" baseline="0" dirty="0">
+                <a:ln>
+                  <a:noFill/>
+                </a:ln>
+                <a:solidFill>
+                  <a:srgbClr val="808080"/>
+                </a:solidFill>
+                <a:effectLst/>
+                <a:latin typeface="Consolas" panose="020B0609020204030204" pitchFamily="49" charset="0"/>
+              </a:rPr>
+              <a:t>// method 1</a:t>
+            </a:r>
+            <a:br>
+              <a:rPr kumimoji="0" lang="zh-CN" altLang="zh-CN" sz="1800" b="0" i="1" u="none" strike="noStrike" cap="none" normalizeH="0" baseline="0" dirty="0">
+                <a:ln>
+                  <a:noFill/>
+                </a:ln>
+                <a:solidFill>
+                  <a:srgbClr val="808080"/>
+                </a:solidFill>
+                <a:effectLst/>
+                <a:latin typeface="Consolas" panose="020B0609020204030204" pitchFamily="49" charset="0"/>
+              </a:rPr>
+            </a:br>
+            <a:r>
+              <a:rPr kumimoji="0" lang="zh-CN" altLang="zh-CN" sz="1800" b="0" i="1" u="none" strike="noStrike" cap="none" normalizeH="0" baseline="0" dirty="0">
+                <a:ln>
+                  <a:noFill/>
+                </a:ln>
+                <a:solidFill>
+                  <a:srgbClr val="808080"/>
+                </a:solidFill>
+                <a:effectLst/>
+                <a:latin typeface="Consolas" panose="020B0609020204030204" pitchFamily="49" charset="0"/>
+              </a:rPr>
+              <a:t>        </a:t>
+            </a:r>
+            <a:r>
+              <a:rPr kumimoji="0" lang="zh-CN" altLang="zh-CN" sz="1800" b="0" i="0" u="none" strike="noStrike" cap="none" normalizeH="0" baseline="0" dirty="0">
+                <a:ln>
+                  <a:noFill/>
+                </a:ln>
+                <a:solidFill>
+                  <a:srgbClr val="000000"/>
+                </a:solidFill>
+                <a:effectLst/>
+                <a:latin typeface="Consolas" panose="020B0609020204030204" pitchFamily="49" charset="0"/>
+              </a:rPr>
+              <a:t>button.setOnClickListener(</a:t>
+            </a:r>
+            <a:r>
+              <a:rPr kumimoji="0" lang="zh-CN" altLang="zh-CN" sz="1800" b="1" i="0" u="none" strike="noStrike" cap="none" normalizeH="0" baseline="0" dirty="0">
+                <a:ln>
+                  <a:noFill/>
+                </a:ln>
+                <a:solidFill>
+                  <a:srgbClr val="000080"/>
+                </a:solidFill>
+                <a:effectLst/>
+                <a:latin typeface="Consolas" panose="020B0609020204030204" pitchFamily="49" charset="0"/>
+              </a:rPr>
+              <a:t>new </a:t>
+            </a:r>
+            <a:r>
+              <a:rPr kumimoji="0" lang="zh-CN" altLang="zh-CN" sz="1800" b="0" i="0" u="none" strike="noStrike" cap="none" normalizeH="0" baseline="0" dirty="0">
+                <a:ln>
+                  <a:noFill/>
+                </a:ln>
+                <a:solidFill>
+                  <a:srgbClr val="000000"/>
+                </a:solidFill>
+                <a:effectLst/>
+                <a:latin typeface="Consolas" panose="020B0609020204030204" pitchFamily="49" charset="0"/>
+              </a:rPr>
+              <a:t>View.OnClickListener() {</a:t>
+            </a:r>
+            <a:br>
+              <a:rPr kumimoji="0" lang="zh-CN" altLang="zh-CN" sz="1800" b="0" i="0" u="none" strike="noStrike" cap="none" normalizeH="0" baseline="0" dirty="0">
+                <a:ln>
+                  <a:noFill/>
+                </a:ln>
+                <a:solidFill>
+                  <a:srgbClr val="000000"/>
+                </a:solidFill>
+                <a:effectLst/>
+                <a:latin typeface="Consolas" panose="020B0609020204030204" pitchFamily="49" charset="0"/>
+              </a:rPr>
+            </a:br>
+            <a:r>
+              <a:rPr kumimoji="0" lang="zh-CN" altLang="zh-CN" sz="1800" b="0" i="0" u="none" strike="noStrike" cap="none" normalizeH="0" baseline="0" dirty="0">
+                <a:ln>
+                  <a:noFill/>
+                </a:ln>
+                <a:solidFill>
+                  <a:srgbClr val="000000"/>
+                </a:solidFill>
+                <a:effectLst/>
+                <a:latin typeface="Consolas" panose="020B0609020204030204" pitchFamily="49" charset="0"/>
+              </a:rPr>
+              <a:t>            </a:t>
+            </a:r>
+            <a:r>
+              <a:rPr kumimoji="0" lang="zh-CN" altLang="zh-CN" sz="1800" b="0" i="0" u="none" strike="noStrike" cap="none" normalizeH="0" baseline="0" dirty="0">
+                <a:ln>
+                  <a:noFill/>
+                </a:ln>
+                <a:solidFill>
+                  <a:srgbClr val="808000"/>
+                </a:solidFill>
+                <a:effectLst/>
+                <a:latin typeface="Consolas" panose="020B0609020204030204" pitchFamily="49" charset="0"/>
+              </a:rPr>
+              <a:t>@Override</a:t>
+            </a:r>
+            <a:br>
+              <a:rPr kumimoji="0" lang="zh-CN" altLang="zh-CN" sz="1800" b="0" i="0" u="none" strike="noStrike" cap="none" normalizeH="0" baseline="0" dirty="0">
+                <a:ln>
+                  <a:noFill/>
+                </a:ln>
+                <a:solidFill>
+                  <a:srgbClr val="808000"/>
+                </a:solidFill>
+                <a:effectLst/>
+                <a:latin typeface="Consolas" panose="020B0609020204030204" pitchFamily="49" charset="0"/>
+              </a:rPr>
+            </a:br>
+            <a:r>
+              <a:rPr kumimoji="0" lang="zh-CN" altLang="zh-CN" sz="1800" b="0" i="0" u="none" strike="noStrike" cap="none" normalizeH="0" baseline="0" dirty="0">
+                <a:ln>
+                  <a:noFill/>
+                </a:ln>
+                <a:solidFill>
+                  <a:srgbClr val="808000"/>
+                </a:solidFill>
+                <a:effectLst/>
+                <a:latin typeface="Consolas" panose="020B0609020204030204" pitchFamily="49" charset="0"/>
+              </a:rPr>
+              <a:t>            </a:t>
+            </a:r>
+            <a:r>
+              <a:rPr kumimoji="0" lang="zh-CN" altLang="zh-CN" sz="1800" b="1" i="0" u="none" strike="noStrike" cap="none" normalizeH="0" baseline="0" dirty="0">
+                <a:ln>
+                  <a:noFill/>
+                </a:ln>
+                <a:solidFill>
+                  <a:srgbClr val="000080"/>
+                </a:solidFill>
+                <a:effectLst/>
+                <a:latin typeface="Consolas" panose="020B0609020204030204" pitchFamily="49" charset="0"/>
+              </a:rPr>
+              <a:t>public void </a:t>
+            </a:r>
+            <a:r>
+              <a:rPr kumimoji="0" lang="zh-CN" altLang="zh-CN" sz="1800" b="0" i="0" u="none" strike="noStrike" cap="none" normalizeH="0" baseline="0" dirty="0">
+                <a:ln>
+                  <a:noFill/>
+                </a:ln>
+                <a:solidFill>
+                  <a:srgbClr val="000000"/>
+                </a:solidFill>
+                <a:effectLst/>
+                <a:latin typeface="Consolas" panose="020B0609020204030204" pitchFamily="49" charset="0"/>
+              </a:rPr>
+              <a:t>onClick(View view) { }</a:t>
+            </a:r>
+            <a:br>
+              <a:rPr kumimoji="0" lang="zh-CN" altLang="zh-CN" sz="1800" b="0" i="0" u="none" strike="noStrike" cap="none" normalizeH="0" baseline="0" dirty="0">
+                <a:ln>
+                  <a:noFill/>
+                </a:ln>
+                <a:solidFill>
+                  <a:srgbClr val="000000"/>
+                </a:solidFill>
+                <a:effectLst/>
+                <a:latin typeface="Consolas" panose="020B0609020204030204" pitchFamily="49" charset="0"/>
+              </a:rPr>
+            </a:br>
+            <a:r>
+              <a:rPr kumimoji="0" lang="zh-CN" altLang="zh-CN" sz="1800" b="0" i="0" u="none" strike="noStrike" cap="none" normalizeH="0" baseline="0" dirty="0">
+                <a:ln>
+                  <a:noFill/>
+                </a:ln>
+                <a:solidFill>
+                  <a:srgbClr val="000000"/>
+                </a:solidFill>
+                <a:effectLst/>
+                <a:latin typeface="Consolas" panose="020B0609020204030204" pitchFamily="49" charset="0"/>
+              </a:rPr>
+              <a:t>        });    </a:t>
+            </a:r>
+            <a:r>
+              <a:rPr kumimoji="0" lang="zh-CN" altLang="zh-CN" sz="1800" b="0" i="1" u="none" strike="noStrike" cap="none" normalizeH="0" baseline="0" dirty="0">
+                <a:ln>
+                  <a:noFill/>
+                </a:ln>
+                <a:solidFill>
+                  <a:srgbClr val="808080"/>
+                </a:solidFill>
+                <a:effectLst/>
+                <a:latin typeface="Consolas" panose="020B0609020204030204" pitchFamily="49" charset="0"/>
+              </a:rPr>
+              <a:t>// method 2</a:t>
+            </a:r>
+            <a:br>
+              <a:rPr kumimoji="0" lang="zh-CN" altLang="zh-CN" sz="1800" b="0" i="1" u="none" strike="noStrike" cap="none" normalizeH="0" baseline="0" dirty="0">
+                <a:ln>
+                  <a:noFill/>
+                </a:ln>
+                <a:solidFill>
+                  <a:srgbClr val="808080"/>
+                </a:solidFill>
+                <a:effectLst/>
+                <a:latin typeface="Consolas" panose="020B0609020204030204" pitchFamily="49" charset="0"/>
+              </a:rPr>
+            </a:br>
+            <a:r>
+              <a:rPr kumimoji="0" lang="zh-CN" altLang="zh-CN" sz="1800" b="0" i="1" u="none" strike="noStrike" cap="none" normalizeH="0" baseline="0" dirty="0">
+                <a:ln>
+                  <a:noFill/>
+                </a:ln>
+                <a:solidFill>
+                  <a:srgbClr val="808080"/>
+                </a:solidFill>
+                <a:effectLst/>
+                <a:latin typeface="Consolas" panose="020B0609020204030204" pitchFamily="49" charset="0"/>
+              </a:rPr>
+              <a:t>    </a:t>
+            </a:r>
+            <a:r>
+              <a:rPr kumimoji="0" lang="zh-CN" altLang="zh-CN" sz="1800" b="0" i="0" u="none" strike="noStrike" cap="none" normalizeH="0" baseline="0" dirty="0">
+                <a:ln>
+                  <a:noFill/>
+                </a:ln>
+                <a:solidFill>
+                  <a:srgbClr val="000000"/>
+                </a:solidFill>
+                <a:effectLst/>
+                <a:latin typeface="Consolas" panose="020B0609020204030204" pitchFamily="49" charset="0"/>
+              </a:rPr>
+              <a:t>}</a:t>
+            </a:r>
+            <a:br>
+              <a:rPr kumimoji="0" lang="zh-CN" altLang="zh-CN" sz="1800" b="0" i="0" u="none" strike="noStrike" cap="none" normalizeH="0" baseline="0" dirty="0">
+                <a:ln>
+                  <a:noFill/>
+                </a:ln>
+                <a:solidFill>
+                  <a:srgbClr val="000000"/>
+                </a:solidFill>
+                <a:effectLst/>
+                <a:latin typeface="Consolas" panose="020B0609020204030204" pitchFamily="49" charset="0"/>
+              </a:rPr>
+            </a:br>
+            <a:br>
+              <a:rPr kumimoji="0" lang="zh-CN" altLang="zh-CN" sz="1800" b="0" i="0" u="none" strike="noStrike" cap="none" normalizeH="0" baseline="0" dirty="0">
+                <a:ln>
+                  <a:noFill/>
+                </a:ln>
+                <a:solidFill>
+                  <a:srgbClr val="000000"/>
+                </a:solidFill>
+                <a:effectLst/>
+                <a:latin typeface="Consolas" panose="020B0609020204030204" pitchFamily="49" charset="0"/>
+              </a:rPr>
+            </a:br>
+            <a:r>
+              <a:rPr kumimoji="0" lang="zh-CN" altLang="zh-CN" sz="1800" b="0" i="0" u="none" strike="noStrike" cap="none" normalizeH="0" baseline="0" dirty="0">
+                <a:ln>
+                  <a:noFill/>
+                </a:ln>
+                <a:solidFill>
+                  <a:srgbClr val="000000"/>
+                </a:solidFill>
+                <a:effectLst/>
+                <a:latin typeface="Consolas" panose="020B0609020204030204" pitchFamily="49" charset="0"/>
+              </a:rPr>
+              <a:t>    </a:t>
+            </a:r>
+            <a:r>
+              <a:rPr kumimoji="0" lang="zh-CN" altLang="zh-CN" sz="1800" b="1" i="0" u="none" strike="noStrike" cap="none" normalizeH="0" baseline="0" dirty="0">
+                <a:ln>
+                  <a:noFill/>
+                </a:ln>
+                <a:solidFill>
+                  <a:srgbClr val="000080"/>
+                </a:solidFill>
+                <a:effectLst/>
+                <a:latin typeface="Consolas" panose="020B0609020204030204" pitchFamily="49" charset="0"/>
+              </a:rPr>
+              <a:t>class </a:t>
+            </a:r>
+            <a:r>
+              <a:rPr kumimoji="0" lang="zh-CN" altLang="zh-CN" sz="1800" b="0" i="0" u="none" strike="noStrike" cap="none" normalizeH="0" baseline="0" dirty="0">
+                <a:ln>
+                  <a:noFill/>
+                </a:ln>
+                <a:solidFill>
+                  <a:srgbClr val="000000"/>
+                </a:solidFill>
+                <a:effectLst/>
+                <a:latin typeface="Consolas" panose="020B0609020204030204" pitchFamily="49" charset="0"/>
+              </a:rPr>
+              <a:t>LabelClickListener </a:t>
+            </a:r>
+            <a:r>
+              <a:rPr kumimoji="0" lang="zh-CN" altLang="zh-CN" sz="1800" b="1" i="0" u="none" strike="noStrike" cap="none" normalizeH="0" baseline="0" dirty="0">
+                <a:ln>
+                  <a:noFill/>
+                </a:ln>
+                <a:solidFill>
+                  <a:srgbClr val="000080"/>
+                </a:solidFill>
+                <a:effectLst/>
+                <a:latin typeface="Consolas" panose="020B0609020204030204" pitchFamily="49" charset="0"/>
+              </a:rPr>
+              <a:t>implements  </a:t>
+            </a:r>
+            <a:r>
+              <a:rPr kumimoji="0" lang="zh-CN" altLang="zh-CN" sz="1800" b="0" i="0" u="none" strike="noStrike" cap="none" normalizeH="0" baseline="0" dirty="0">
+                <a:ln>
+                  <a:noFill/>
+                </a:ln>
+                <a:solidFill>
+                  <a:srgbClr val="000000"/>
+                </a:solidFill>
+                <a:effectLst/>
+                <a:latin typeface="Consolas" panose="020B0609020204030204" pitchFamily="49" charset="0"/>
+              </a:rPr>
+              <a:t>View.OnClickListener</a:t>
+            </a:r>
+            <a:br>
+              <a:rPr kumimoji="0" lang="zh-CN" altLang="zh-CN" sz="1800" b="0" i="0" u="none" strike="noStrike" cap="none" normalizeH="0" baseline="0" dirty="0">
+                <a:ln>
+                  <a:noFill/>
+                </a:ln>
+                <a:solidFill>
+                  <a:srgbClr val="000000"/>
+                </a:solidFill>
+                <a:effectLst/>
+                <a:latin typeface="Consolas" panose="020B0609020204030204" pitchFamily="49" charset="0"/>
+              </a:rPr>
+            </a:br>
+            <a:r>
+              <a:rPr kumimoji="0" lang="zh-CN" altLang="zh-CN" sz="1800" b="0" i="0" u="none" strike="noStrike" cap="none" normalizeH="0" baseline="0" dirty="0">
+                <a:ln>
+                  <a:noFill/>
+                </a:ln>
+                <a:solidFill>
+                  <a:srgbClr val="000000"/>
+                </a:solidFill>
+                <a:effectLst/>
+                <a:latin typeface="Consolas" panose="020B0609020204030204" pitchFamily="49" charset="0"/>
+              </a:rPr>
+              <a:t>    {</a:t>
+            </a:r>
+            <a:br>
+              <a:rPr kumimoji="0" lang="zh-CN" altLang="zh-CN" sz="1800" b="0" i="0" u="none" strike="noStrike" cap="none" normalizeH="0" baseline="0" dirty="0">
+                <a:ln>
+                  <a:noFill/>
+                </a:ln>
+                <a:solidFill>
+                  <a:srgbClr val="000000"/>
+                </a:solidFill>
+                <a:effectLst/>
+                <a:latin typeface="Consolas" panose="020B0609020204030204" pitchFamily="49" charset="0"/>
+              </a:rPr>
+            </a:br>
+            <a:r>
+              <a:rPr kumimoji="0" lang="zh-CN" altLang="zh-CN" sz="1800" b="0" i="0" u="none" strike="noStrike" cap="none" normalizeH="0" baseline="0" dirty="0">
+                <a:ln>
+                  <a:noFill/>
+                </a:ln>
+                <a:solidFill>
+                  <a:srgbClr val="000000"/>
+                </a:solidFill>
+                <a:effectLst/>
+                <a:latin typeface="Consolas" panose="020B0609020204030204" pitchFamily="49" charset="0"/>
+              </a:rPr>
+              <a:t>        </a:t>
+            </a:r>
+            <a:r>
+              <a:rPr kumimoji="0" lang="zh-CN" altLang="zh-CN" sz="1800" b="0" i="0" u="none" strike="noStrike" cap="none" normalizeH="0" baseline="0" dirty="0">
+                <a:ln>
+                  <a:noFill/>
+                </a:ln>
+                <a:solidFill>
+                  <a:srgbClr val="808000"/>
+                </a:solidFill>
+                <a:effectLst/>
+                <a:latin typeface="Consolas" panose="020B0609020204030204" pitchFamily="49" charset="0"/>
+              </a:rPr>
+              <a:t>@Override</a:t>
+            </a:r>
+            <a:br>
+              <a:rPr kumimoji="0" lang="zh-CN" altLang="zh-CN" sz="1800" b="0" i="0" u="none" strike="noStrike" cap="none" normalizeH="0" baseline="0" dirty="0">
+                <a:ln>
+                  <a:noFill/>
+                </a:ln>
+                <a:solidFill>
+                  <a:srgbClr val="808000"/>
+                </a:solidFill>
+                <a:effectLst/>
+                <a:latin typeface="Consolas" panose="020B0609020204030204" pitchFamily="49" charset="0"/>
+              </a:rPr>
+            </a:br>
+            <a:r>
+              <a:rPr kumimoji="0" lang="zh-CN" altLang="zh-CN" sz="1800" b="0" i="0" u="none" strike="noStrike" cap="none" normalizeH="0" baseline="0" dirty="0">
+                <a:ln>
+                  <a:noFill/>
+                </a:ln>
+                <a:solidFill>
+                  <a:srgbClr val="808000"/>
+                </a:solidFill>
+                <a:effectLst/>
+                <a:latin typeface="Consolas" panose="020B0609020204030204" pitchFamily="49" charset="0"/>
+              </a:rPr>
+              <a:t>        </a:t>
+            </a:r>
+            <a:r>
+              <a:rPr kumimoji="0" lang="zh-CN" altLang="zh-CN" sz="1800" b="1" i="0" u="none" strike="noStrike" cap="none" normalizeH="0" baseline="0" dirty="0">
+                <a:ln>
+                  <a:noFill/>
+                </a:ln>
+                <a:solidFill>
+                  <a:srgbClr val="000080"/>
+                </a:solidFill>
+                <a:effectLst/>
+                <a:latin typeface="Consolas" panose="020B0609020204030204" pitchFamily="49" charset="0"/>
+              </a:rPr>
+              <a:t>public  void </a:t>
+            </a:r>
+            <a:r>
+              <a:rPr kumimoji="0" lang="zh-CN" altLang="zh-CN" sz="1800" b="0" i="0" u="none" strike="noStrike" cap="none" normalizeH="0" baseline="0" dirty="0">
+                <a:ln>
+                  <a:noFill/>
+                </a:ln>
+                <a:solidFill>
+                  <a:srgbClr val="000000"/>
+                </a:solidFill>
+                <a:effectLst/>
+                <a:latin typeface="Consolas" panose="020B0609020204030204" pitchFamily="49" charset="0"/>
+              </a:rPr>
+              <a:t>onClick(View v){ }</a:t>
+            </a:r>
+            <a:br>
+              <a:rPr kumimoji="0" lang="zh-CN" altLang="zh-CN" sz="1800" b="0" i="0" u="none" strike="noStrike" cap="none" normalizeH="0" baseline="0" dirty="0">
+                <a:ln>
+                  <a:noFill/>
+                </a:ln>
+                <a:solidFill>
+                  <a:srgbClr val="000000"/>
+                </a:solidFill>
+                <a:effectLst/>
+                <a:latin typeface="Consolas" panose="020B0609020204030204" pitchFamily="49" charset="0"/>
+              </a:rPr>
+            </a:br>
+            <a:r>
+              <a:rPr kumimoji="0" lang="zh-CN" altLang="zh-CN" sz="1800" b="0" i="0" u="none" strike="noStrike" cap="none" normalizeH="0" baseline="0" dirty="0">
+                <a:ln>
+                  <a:noFill/>
+                </a:ln>
+                <a:solidFill>
+                  <a:srgbClr val="000000"/>
+                </a:solidFill>
+                <a:effectLst/>
+                <a:latin typeface="Consolas" panose="020B0609020204030204" pitchFamily="49" charset="0"/>
+              </a:rPr>
+              <a:t>    }</a:t>
+            </a:r>
+            <a:br>
+              <a:rPr kumimoji="0" lang="zh-CN" altLang="zh-CN" sz="1800" b="0" i="0" u="none" strike="noStrike" cap="none" normalizeH="0" baseline="0" dirty="0">
+                <a:ln>
+                  <a:noFill/>
+                </a:ln>
+                <a:solidFill>
+                  <a:srgbClr val="000000"/>
+                </a:solidFill>
+                <a:effectLst/>
+                <a:latin typeface="Consolas" panose="020B0609020204030204" pitchFamily="49" charset="0"/>
+              </a:rPr>
+            </a:br>
+            <a:br>
+              <a:rPr kumimoji="0" lang="zh-CN" altLang="zh-CN" sz="1800" b="0" i="0" u="none" strike="noStrike" cap="none" normalizeH="0" baseline="0" dirty="0">
+                <a:ln>
+                  <a:noFill/>
+                </a:ln>
+                <a:solidFill>
+                  <a:srgbClr val="000000"/>
+                </a:solidFill>
+                <a:effectLst/>
+                <a:latin typeface="Consolas" panose="020B0609020204030204" pitchFamily="49" charset="0"/>
+              </a:rPr>
+            </a:br>
+            <a:r>
+              <a:rPr kumimoji="0" lang="zh-CN" altLang="zh-CN" sz="1800" b="0" i="0" u="none" strike="noStrike" cap="none" normalizeH="0" baseline="0" dirty="0">
+                <a:ln>
+                  <a:noFill/>
+                </a:ln>
+                <a:solidFill>
+                  <a:srgbClr val="000000"/>
+                </a:solidFill>
+                <a:effectLst/>
+                <a:latin typeface="Consolas" panose="020B0609020204030204" pitchFamily="49" charset="0"/>
+              </a:rPr>
+              <a:t>    </a:t>
+            </a:r>
+            <a:r>
+              <a:rPr kumimoji="0" lang="zh-CN" altLang="zh-CN" sz="1800" b="1" i="0" u="none" strike="noStrike" cap="none" normalizeH="0" baseline="0" dirty="0">
+                <a:ln>
+                  <a:noFill/>
+                </a:ln>
+                <a:solidFill>
+                  <a:srgbClr val="000080"/>
+                </a:solidFill>
+                <a:effectLst/>
+                <a:latin typeface="Consolas" panose="020B0609020204030204" pitchFamily="49" charset="0"/>
+              </a:rPr>
+              <a:t>public void </a:t>
+            </a:r>
+            <a:r>
+              <a:rPr kumimoji="0" lang="zh-CN" altLang="zh-CN" sz="1800" b="0" i="0" u="none" strike="noStrike" cap="none" normalizeH="0" baseline="0" dirty="0">
+                <a:ln>
+                  <a:noFill/>
+                </a:ln>
+                <a:solidFill>
+                  <a:srgbClr val="000000"/>
+                </a:solidFill>
+                <a:effectLst/>
+                <a:latin typeface="Consolas" panose="020B0609020204030204" pitchFamily="49" charset="0"/>
+              </a:rPr>
+              <a:t>labelOnclick(View v){}   </a:t>
+            </a:r>
+            <a:r>
+              <a:rPr kumimoji="0" lang="zh-CN" altLang="zh-CN" sz="1800" b="0" i="1" u="none" strike="noStrike" cap="none" normalizeH="0" baseline="0" dirty="0">
+                <a:ln>
+                  <a:noFill/>
+                </a:ln>
+                <a:solidFill>
+                  <a:srgbClr val="808080"/>
+                </a:solidFill>
+                <a:effectLst/>
+                <a:latin typeface="Consolas" panose="020B0609020204030204" pitchFamily="49" charset="0"/>
+              </a:rPr>
+              <a:t>// method 3</a:t>
+            </a:r>
+            <a:br>
+              <a:rPr kumimoji="0" lang="zh-CN" altLang="zh-CN" sz="1800" b="0" i="1" u="none" strike="noStrike" cap="none" normalizeH="0" baseline="0" dirty="0">
+                <a:ln>
+                  <a:noFill/>
+                </a:ln>
+                <a:solidFill>
+                  <a:srgbClr val="808080"/>
+                </a:solidFill>
+                <a:effectLst/>
+                <a:latin typeface="Consolas" panose="020B0609020204030204" pitchFamily="49" charset="0"/>
+              </a:rPr>
+            </a:br>
+            <a:r>
+              <a:rPr kumimoji="0" lang="zh-CN" altLang="zh-CN" sz="1800" b="0" i="0" u="none" strike="noStrike" cap="none" normalizeH="0" baseline="0" dirty="0">
+                <a:ln>
+                  <a:noFill/>
+                </a:ln>
+                <a:solidFill>
+                  <a:srgbClr val="000000"/>
+                </a:solidFill>
+                <a:effectLst/>
+                <a:latin typeface="Consolas" panose="020B0609020204030204" pitchFamily="49" charset="0"/>
+              </a:rPr>
+              <a:t>}  </a:t>
+            </a:r>
+            <a:r>
+              <a:rPr kumimoji="0" lang="zh-CN" altLang="zh-CN" sz="1800" b="0" i="1" u="none" strike="noStrike" cap="none" normalizeH="0" baseline="0" dirty="0">
+                <a:ln>
+                  <a:noFill/>
+                </a:ln>
+                <a:solidFill>
+                  <a:srgbClr val="808080"/>
+                </a:solidFill>
+                <a:effectLst/>
+                <a:latin typeface="Consolas" panose="020B0609020204030204" pitchFamily="49" charset="0"/>
+              </a:rPr>
+              <a:t>// end of MainActivity</a:t>
+            </a:r>
+            <a:endParaRPr kumimoji="0" lang="zh-CN" altLang="zh-CN" sz="1800" b="0" i="0" u="none" strike="noStrike" cap="none" normalizeH="0" baseline="0" dirty="0">
+              <a:ln>
+                <a:noFill/>
+              </a:ln>
+              <a:solidFill>
+                <a:schemeClr val="tx1"/>
+              </a:solidFill>
+              <a:effectLst/>
+              <a:latin typeface="Arial" panose="020B0604020202020204" pitchFamily="34" charset="0"/>
+            </a:endParaRPr>
           </a:p>
         </p:txBody>
       </p:sp>
       <p:sp>
         <p:nvSpPr>
-          <p:cNvPr id="3" name="副标题 2">
+          <p:cNvPr id="2" name="文本框 1">
             <a:extLst>
               <a:ext uri="{FF2B5EF4-FFF2-40B4-BE49-F238E27FC236}">
-                <a16:creationId xmlns:a16="http://schemas.microsoft.com/office/drawing/2014/main" id="{E9BA3DB7-630D-4259-B03F-CACCFD76B624}"/>
+                <a16:creationId xmlns:a16="http://schemas.microsoft.com/office/drawing/2014/main" id="{5B874A19-FC72-40F8-9304-7EBC9CFE8ADF}"/>
               </a:ext>
             </a:extLst>
           </p:cNvPr>
-          <p:cNvSpPr>
-            <a:spLocks noGrp="1"/>
-          </p:cNvSpPr>
-          <p:nvPr>
-            <p:ph type="subTitle" idx="1"/>
-          </p:nvPr>
+          <p:cNvSpPr txBox="1"/>
+          <p:nvPr/>
         </p:nvSpPr>
-        <p:spPr/>
+        <p:spPr>
+          <a:xfrm>
+            <a:off x="433431" y="0"/>
+            <a:ext cx="2432808" cy="584775"/>
+          </a:xfrm>
+          <a:prstGeom prst="rect">
+            <a:avLst/>
+          </a:prstGeom>
+          <a:noFill/>
+        </p:spPr>
         <p:txBody>
-          <a:bodyPr/>
+          <a:bodyPr wrap="square" rtlCol="0">
+            <a:spAutoFit/>
+          </a:bodyPr>
           <a:lstStyle/>
           <a:p>
-            <a:endParaRPr lang="zh-CN" altLang="en-US"/>
+            <a:r>
+              <a:rPr lang="zh-CN" altLang="en-US" sz="3200" b="1" dirty="0"/>
+              <a:t>前情提要</a:t>
+            </a:r>
           </a:p>
         </p:txBody>
       </p:sp>
     </p:spTree>
     <p:extLst>
       <p:ext uri="{BB962C8B-B14F-4D97-AF65-F5344CB8AC3E}">
-        <p14:creationId xmlns:p14="http://schemas.microsoft.com/office/powerpoint/2010/main" val="1166680527"/>
+        <p14:creationId xmlns:p14="http://schemas.microsoft.com/office/powerpoint/2010/main" val="54286833"/>
       </p:ext>
     </p:extLst>
   </p:cSld>
@@ -9419,7 +10441,7 @@
           <p:cNvPr id="2" name="标题 1">
             <a:extLst>
               <a:ext uri="{FF2B5EF4-FFF2-40B4-BE49-F238E27FC236}">
-                <a16:creationId xmlns:a16="http://schemas.microsoft.com/office/drawing/2014/main" id="{155DDA61-E333-4013-8C90-B612AF0E3429}"/>
+                <a16:creationId xmlns:a16="http://schemas.microsoft.com/office/drawing/2014/main" id="{6FB0C5A2-2772-4B65-A3DD-C2C6B6983B24}"/>
               </a:ext>
             </a:extLst>
           </p:cNvPr>
@@ -9427,7 +10449,7 @@
             <a:spLocks noGrp="1"/>
           </p:cNvSpPr>
           <p:nvPr>
-            <p:ph type="title"/>
+            <p:ph type="ctrTitle"/>
           </p:nvPr>
         </p:nvSpPr>
         <p:spPr/>
@@ -9437,17 +10459,22 @@
           <a:p>
             <a:r>
               <a:rPr lang="zh-CN" altLang="en-US" dirty="0"/>
-              <a:t>目录</a:t>
-            </a:r>
+              <a:t>安卓基本组件</a:t>
+            </a:r>
+            <a:r>
+              <a:rPr lang="en-US" altLang="zh-CN" dirty="0"/>
+              <a:t>2</a:t>
+            </a:r>
+            <a:endParaRPr lang="zh-CN" altLang="en-US" dirty="0"/>
           </a:p>
         </p:txBody>
       </p:sp>
       <p:sp>
         <p:nvSpPr>
-          <p:cNvPr id="3" name="内容占位符 2">
+          <p:cNvPr id="3" name="副标题 2">
             <a:extLst>
               <a:ext uri="{FF2B5EF4-FFF2-40B4-BE49-F238E27FC236}">
-                <a16:creationId xmlns:a16="http://schemas.microsoft.com/office/drawing/2014/main" id="{4B821970-5211-4A16-BFD8-798584B21F4E}"/>
+                <a16:creationId xmlns:a16="http://schemas.microsoft.com/office/drawing/2014/main" id="{E9BA3DB7-630D-4259-B03F-CACCFD76B624}"/>
               </a:ext>
             </a:extLst>
           </p:cNvPr>
@@ -9455,7 +10482,7 @@
             <a:spLocks noGrp="1"/>
           </p:cNvSpPr>
           <p:nvPr>
-            <p:ph idx="1"/>
+            <p:ph type="subTitle" idx="1"/>
           </p:nvPr>
         </p:nvSpPr>
         <p:spPr/>
@@ -9463,68 +10490,14 @@
           <a:bodyPr/>
           <a:lstStyle/>
           <a:p>
-            <a:r>
-              <a:rPr lang="en-US" altLang="zh-CN" b="1" dirty="0">
-                <a:solidFill>
-                  <a:srgbClr val="333333"/>
-                </a:solidFill>
-                <a:latin typeface="Helvetica Neue"/>
-              </a:rPr>
-              <a:t>Dialog(</a:t>
-            </a:r>
-            <a:r>
-              <a:rPr lang="zh-CN" altLang="en-US" b="1" dirty="0">
-                <a:solidFill>
-                  <a:srgbClr val="333333"/>
-                </a:solidFill>
-                <a:latin typeface="Helvetica Neue"/>
-              </a:rPr>
-              <a:t>对话框</a:t>
-            </a:r>
-            <a:r>
-              <a:rPr lang="en-US" altLang="zh-CN" b="1" dirty="0">
-                <a:solidFill>
-                  <a:srgbClr val="333333"/>
-                </a:solidFill>
-                <a:latin typeface="Helvetica Neue"/>
-              </a:rPr>
-              <a:t>)</a:t>
-            </a:r>
-          </a:p>
-          <a:p>
-            <a:r>
-              <a:rPr lang="zh-CN" altLang="en-US" b="1" dirty="0">
-                <a:latin typeface="Roboto"/>
-              </a:rPr>
-              <a:t>资源文件</a:t>
-            </a:r>
-            <a:endParaRPr lang="zh-CN" altLang="en-US" b="1" i="0" dirty="0">
-              <a:effectLst/>
-              <a:latin typeface="Roboto"/>
-            </a:endParaRPr>
-          </a:p>
-          <a:p>
-            <a:endParaRPr lang="en-US" altLang="zh-CN" b="1" dirty="0">
-              <a:solidFill>
-                <a:srgbClr val="333333"/>
-              </a:solidFill>
-              <a:latin typeface="Helvetica Neue"/>
-            </a:endParaRPr>
-          </a:p>
-          <a:p>
-            <a:endParaRPr lang="zh-CN" altLang="en-US" b="1" dirty="0">
-              <a:solidFill>
-                <a:srgbClr val="333333"/>
-              </a:solidFill>
-              <a:latin typeface="Helvetica Neue"/>
-            </a:endParaRPr>
+            <a:endParaRPr lang="zh-CN" altLang="en-US"/>
           </a:p>
         </p:txBody>
       </p:sp>
     </p:spTree>
     <p:extLst>
       <p:ext uri="{BB962C8B-B14F-4D97-AF65-F5344CB8AC3E}">
-        <p14:creationId xmlns:p14="http://schemas.microsoft.com/office/powerpoint/2010/main" val="1188796406"/>
+        <p14:creationId xmlns:p14="http://schemas.microsoft.com/office/powerpoint/2010/main" val="1166680527"/>
       </p:ext>
     </p:extLst>
   </p:cSld>
@@ -11885,12 +12858,12 @@
               <a:t>修改代码实现</a:t>
             </a:r>
             <a:r>
-              <a:rPr lang="en-US" altLang="zh-CN" dirty="0"/>
-              <a:t>Toast</a:t>
+              <a:rPr lang="en-US" altLang="zh-CN" dirty="0" err="1"/>
+              <a:t>MainActivity</a:t>
             </a:r>
             <a:r>
               <a:rPr lang="zh-CN" altLang="en-US" dirty="0"/>
-              <a:t>显示不同按钮事件响应</a:t>
+              <a:t>显示不同按钮事件响应结果</a:t>
             </a:r>
           </a:p>
         </p:txBody>
@@ -16244,1045 +17217,107 @@
       </p:grpSpPr>
       <p:sp>
         <p:nvSpPr>
-          <p:cNvPr id="4" name="Rectangle 1">
+          <p:cNvPr id="2" name="标题 1">
             <a:extLst>
               <a:ext uri="{FF2B5EF4-FFF2-40B4-BE49-F238E27FC236}">
-                <a16:creationId xmlns:a16="http://schemas.microsoft.com/office/drawing/2014/main" id="{3931581E-B33F-4E7E-B734-819C7EA60716}"/>
+                <a16:creationId xmlns:a16="http://schemas.microsoft.com/office/drawing/2014/main" id="{155DDA61-E333-4013-8C90-B612AF0E3429}"/>
               </a:ext>
             </a:extLst>
           </p:cNvPr>
           <p:cNvSpPr>
-            <a:spLocks noGrp="1" noChangeArrowheads="1"/>
+            <a:spLocks noGrp="1"/>
+          </p:cNvSpPr>
+          <p:nvPr>
+            <p:ph type="title"/>
+          </p:nvPr>
+        </p:nvSpPr>
+        <p:spPr/>
+        <p:txBody>
+          <a:bodyPr/>
+          <a:lstStyle/>
+          <a:p>
+            <a:r>
+              <a:rPr lang="zh-CN" altLang="en-US" dirty="0"/>
+              <a:t>目录</a:t>
+            </a:r>
+          </a:p>
+        </p:txBody>
+      </p:sp>
+      <p:sp>
+        <p:nvSpPr>
+          <p:cNvPr id="3" name="内容占位符 2">
+            <a:extLst>
+              <a:ext uri="{FF2B5EF4-FFF2-40B4-BE49-F238E27FC236}">
+                <a16:creationId xmlns:a16="http://schemas.microsoft.com/office/drawing/2014/main" id="{4B821970-5211-4A16-BFD8-798584B21F4E}"/>
+              </a:ext>
+            </a:extLst>
+          </p:cNvPr>
+          <p:cNvSpPr>
+            <a:spLocks noGrp="1"/>
           </p:cNvSpPr>
           <p:nvPr>
             <p:ph idx="1"/>
           </p:nvPr>
         </p:nvSpPr>
-        <p:spPr bwMode="auto">
-          <a:xfrm>
-            <a:off x="0" y="485005"/>
-            <a:ext cx="11325138" cy="6186309"/>
-          </a:xfrm>
-          <a:prstGeom prst="rect">
-            <a:avLst/>
-          </a:prstGeom>
-          <a:solidFill>
-            <a:srgbClr val="FFFFFF"/>
-          </a:solidFill>
-          <a:ln>
-            <a:noFill/>
-          </a:ln>
-          <a:effectLst/>
-          <a:extLst>
-            <a:ext uri="{91240B29-F687-4F45-9708-019B960494DF}">
-              <a14:hiddenLine xmlns:a14="http://schemas.microsoft.com/office/drawing/2010/main" w="9525">
-                <a:solidFill>
-                  <a:schemeClr val="tx1"/>
-                </a:solidFill>
-                <a:miter lim="800000"/>
-                <a:headEnd/>
-                <a:tailEnd/>
-              </a14:hiddenLine>
-            </a:ext>
-            <a:ext uri="{AF507438-7753-43E0-B8FC-AC1667EBCBE1}">
-              <a14:hiddenEffects xmlns:a14="http://schemas.microsoft.com/office/drawing/2010/main">
-                <a:effectLst>
-                  <a:outerShdw dist="35921" dir="2700000" algn="ctr" rotWithShape="0">
-                    <a:schemeClr val="bg2"/>
-                  </a:outerShdw>
-                </a:effectLst>
-              </a14:hiddenEffects>
-            </a:ext>
-          </a:extLst>
-        </p:spPr>
+        <p:spPr/>
         <p:txBody>
-          <a:bodyPr vert="horz" wrap="square" lIns="91440" tIns="45720" rIns="91440" bIns="45720" numCol="1" anchor="ctr" anchorCtr="0" compatLnSpc="1">
-            <a:prstTxWarp prst="textNoShape">
-              <a:avLst/>
-            </a:prstTxWarp>
-            <a:spAutoFit/>
-          </a:bodyPr>
+          <a:bodyPr/>
           <a:lstStyle/>
           <a:p>
-            <a:pPr marL="0" marR="0" lvl="0" indent="0" algn="l" defTabSz="914400" rtl="0" eaLnBrk="0" fontAlgn="base" latinLnBrk="0" hangingPunct="0">
-              <a:lnSpc>
-                <a:spcPct val="100000"/>
-              </a:lnSpc>
-              <a:spcBef>
-                <a:spcPct val="0"/>
-              </a:spcBef>
-              <a:spcAft>
-                <a:spcPct val="0"/>
-              </a:spcAft>
-              <a:buClrTx/>
-              <a:buSzTx/>
-              <a:buFontTx/>
-              <a:buNone/>
-              <a:tabLst/>
-            </a:pPr>
-            <a:r>
-              <a:rPr kumimoji="0" lang="zh-CN" altLang="zh-CN" sz="1800" b="1" i="0" u="none" strike="noStrike" cap="none" normalizeH="0" baseline="0" dirty="0">
-                <a:ln>
-                  <a:noFill/>
-                </a:ln>
-                <a:solidFill>
-                  <a:srgbClr val="000080"/>
-                </a:solidFill>
-                <a:effectLst/>
-                <a:latin typeface="Consolas" panose="020B0609020204030204" pitchFamily="49" charset="0"/>
-              </a:rPr>
-              <a:t>public class </a:t>
-            </a:r>
-            <a:r>
-              <a:rPr kumimoji="0" lang="zh-CN" altLang="zh-CN" sz="1800" b="0" i="0" u="none" strike="noStrike" cap="none" normalizeH="0" baseline="0" dirty="0">
-                <a:ln>
-                  <a:noFill/>
-                </a:ln>
-                <a:solidFill>
-                  <a:srgbClr val="000000"/>
-                </a:solidFill>
-                <a:effectLst/>
-                <a:latin typeface="Consolas" panose="020B0609020204030204" pitchFamily="49" charset="0"/>
-              </a:rPr>
-              <a:t>MainActivity </a:t>
-            </a:r>
-            <a:r>
-              <a:rPr kumimoji="0" lang="zh-CN" altLang="zh-CN" sz="1800" b="1" i="0" u="none" strike="noStrike" cap="none" normalizeH="0" baseline="0" dirty="0">
-                <a:ln>
-                  <a:noFill/>
-                </a:ln>
-                <a:solidFill>
-                  <a:srgbClr val="000080"/>
-                </a:solidFill>
-                <a:effectLst/>
-                <a:latin typeface="Consolas" panose="020B0609020204030204" pitchFamily="49" charset="0"/>
-              </a:rPr>
-              <a:t>extends </a:t>
-            </a:r>
-            <a:r>
-              <a:rPr kumimoji="0" lang="zh-CN" altLang="zh-CN" sz="1800" b="0" i="0" u="none" strike="noStrike" cap="none" normalizeH="0" baseline="0" dirty="0">
-                <a:ln>
-                  <a:noFill/>
-                </a:ln>
-                <a:solidFill>
-                  <a:srgbClr val="000000"/>
-                </a:solidFill>
-                <a:effectLst/>
-                <a:latin typeface="Consolas" panose="020B0609020204030204" pitchFamily="49" charset="0"/>
-              </a:rPr>
-              <a:t>AppCompatActivity {</a:t>
-            </a:r>
-            <a:br>
-              <a:rPr kumimoji="0" lang="zh-CN" altLang="zh-CN" sz="1800" b="0" i="0" u="none" strike="noStrike" cap="none" normalizeH="0" baseline="0" dirty="0">
-                <a:ln>
-                  <a:noFill/>
-                </a:ln>
-                <a:solidFill>
-                  <a:srgbClr val="000000"/>
-                </a:solidFill>
-                <a:effectLst/>
-                <a:latin typeface="Consolas" panose="020B0609020204030204" pitchFamily="49" charset="0"/>
-              </a:rPr>
-            </a:br>
-            <a:r>
-              <a:rPr kumimoji="0" lang="zh-CN" altLang="zh-CN" sz="1800" b="0" i="0" u="none" strike="noStrike" cap="none" normalizeH="0" baseline="0" dirty="0">
-                <a:ln>
-                  <a:noFill/>
-                </a:ln>
-                <a:solidFill>
-                  <a:srgbClr val="000000"/>
-                </a:solidFill>
-                <a:effectLst/>
-                <a:latin typeface="Consolas" panose="020B0609020204030204" pitchFamily="49" charset="0"/>
-              </a:rPr>
-              <a:t>    </a:t>
-            </a:r>
-            <a:r>
-              <a:rPr kumimoji="0" lang="zh-CN" altLang="zh-CN" sz="1800" b="0" i="0" u="none" strike="noStrike" cap="none" normalizeH="0" baseline="0" dirty="0">
-                <a:ln>
-                  <a:noFill/>
-                </a:ln>
-                <a:solidFill>
-                  <a:srgbClr val="808000"/>
-                </a:solidFill>
-                <a:effectLst/>
-                <a:latin typeface="Consolas" panose="020B0609020204030204" pitchFamily="49" charset="0"/>
-              </a:rPr>
-              <a:t>@Override</a:t>
-            </a:r>
-            <a:br>
-              <a:rPr kumimoji="0" lang="zh-CN" altLang="zh-CN" sz="1800" b="0" i="0" u="none" strike="noStrike" cap="none" normalizeH="0" baseline="0" dirty="0">
-                <a:ln>
-                  <a:noFill/>
-                </a:ln>
-                <a:solidFill>
-                  <a:srgbClr val="808000"/>
-                </a:solidFill>
-                <a:effectLst/>
-                <a:latin typeface="Consolas" panose="020B0609020204030204" pitchFamily="49" charset="0"/>
-              </a:rPr>
-            </a:br>
-            <a:r>
-              <a:rPr kumimoji="0" lang="zh-CN" altLang="zh-CN" sz="1800" b="0" i="0" u="none" strike="noStrike" cap="none" normalizeH="0" baseline="0" dirty="0">
-                <a:ln>
-                  <a:noFill/>
-                </a:ln>
-                <a:solidFill>
-                  <a:srgbClr val="808000"/>
-                </a:solidFill>
-                <a:effectLst/>
-                <a:latin typeface="Consolas" panose="020B0609020204030204" pitchFamily="49" charset="0"/>
-              </a:rPr>
-              <a:t>    </a:t>
-            </a:r>
-            <a:r>
-              <a:rPr kumimoji="0" lang="zh-CN" altLang="zh-CN" sz="1800" b="1" i="0" u="none" strike="noStrike" cap="none" normalizeH="0" baseline="0" dirty="0">
-                <a:ln>
-                  <a:noFill/>
-                </a:ln>
-                <a:solidFill>
-                  <a:srgbClr val="000080"/>
-                </a:solidFill>
-                <a:effectLst/>
-                <a:latin typeface="Consolas" panose="020B0609020204030204" pitchFamily="49" charset="0"/>
-              </a:rPr>
-              <a:t>protected void </a:t>
-            </a:r>
-            <a:r>
-              <a:rPr kumimoji="0" lang="zh-CN" altLang="zh-CN" sz="1800" b="0" i="0" u="none" strike="noStrike" cap="none" normalizeH="0" baseline="0" dirty="0">
-                <a:ln>
-                  <a:noFill/>
-                </a:ln>
-                <a:solidFill>
-                  <a:srgbClr val="000000"/>
-                </a:solidFill>
-                <a:effectLst/>
-                <a:latin typeface="Consolas" panose="020B0609020204030204" pitchFamily="49" charset="0"/>
-              </a:rPr>
-              <a:t>onCreate(Bundle savedInstanceState)</a:t>
-            </a:r>
-            <a:br>
-              <a:rPr kumimoji="0" lang="zh-CN" altLang="zh-CN" sz="1800" b="0" i="0" u="none" strike="noStrike" cap="none" normalizeH="0" baseline="0" dirty="0">
-                <a:ln>
-                  <a:noFill/>
-                </a:ln>
-                <a:solidFill>
-                  <a:srgbClr val="000000"/>
-                </a:solidFill>
-                <a:effectLst/>
-                <a:latin typeface="Consolas" panose="020B0609020204030204" pitchFamily="49" charset="0"/>
-              </a:rPr>
-            </a:br>
-            <a:r>
-              <a:rPr kumimoji="0" lang="zh-CN" altLang="zh-CN" sz="1800" b="0" i="0" u="none" strike="noStrike" cap="none" normalizeH="0" baseline="0" dirty="0">
-                <a:ln>
-                  <a:noFill/>
-                </a:ln>
-                <a:solidFill>
-                  <a:srgbClr val="000000"/>
-                </a:solidFill>
-                <a:effectLst/>
-                <a:latin typeface="Consolas" panose="020B0609020204030204" pitchFamily="49" charset="0"/>
-              </a:rPr>
-              <a:t>    {</a:t>
-            </a:r>
-            <a:br>
-              <a:rPr kumimoji="0" lang="zh-CN" altLang="zh-CN" sz="1800" b="0" i="0" u="none" strike="noStrike" cap="none" normalizeH="0" baseline="0" dirty="0">
-                <a:ln>
-                  <a:noFill/>
-                </a:ln>
-                <a:solidFill>
-                  <a:srgbClr val="000000"/>
-                </a:solidFill>
-                <a:effectLst/>
-                <a:latin typeface="Consolas" panose="020B0609020204030204" pitchFamily="49" charset="0"/>
-              </a:rPr>
-            </a:br>
-            <a:r>
-              <a:rPr kumimoji="0" lang="zh-CN" altLang="zh-CN" sz="1800" b="0" i="0" u="none" strike="noStrike" cap="none" normalizeH="0" baseline="0" dirty="0">
-                <a:ln>
-                  <a:noFill/>
-                </a:ln>
-                <a:solidFill>
-                  <a:srgbClr val="000000"/>
-                </a:solidFill>
-                <a:effectLst/>
-                <a:latin typeface="Consolas" panose="020B0609020204030204" pitchFamily="49" charset="0"/>
-              </a:rPr>
-              <a:t>        </a:t>
-            </a:r>
-            <a:r>
-              <a:rPr kumimoji="0" lang="zh-CN" altLang="zh-CN" sz="1800" b="1" i="0" u="none" strike="noStrike" cap="none" normalizeH="0" baseline="0" dirty="0">
-                <a:ln>
-                  <a:noFill/>
-                </a:ln>
-                <a:solidFill>
-                  <a:srgbClr val="000080"/>
-                </a:solidFill>
-                <a:effectLst/>
-                <a:latin typeface="Consolas" panose="020B0609020204030204" pitchFamily="49" charset="0"/>
-              </a:rPr>
-              <a:t>super</a:t>
-            </a:r>
-            <a:r>
-              <a:rPr kumimoji="0" lang="zh-CN" altLang="zh-CN" sz="1800" b="0" i="0" u="none" strike="noStrike" cap="none" normalizeH="0" baseline="0" dirty="0">
-                <a:ln>
-                  <a:noFill/>
-                </a:ln>
-                <a:solidFill>
-                  <a:srgbClr val="000000"/>
-                </a:solidFill>
-                <a:effectLst/>
-                <a:latin typeface="Consolas" panose="020B0609020204030204" pitchFamily="49" charset="0"/>
-              </a:rPr>
-              <a:t>.onCreate(savedInstanceState);</a:t>
-            </a:r>
-            <a:br>
-              <a:rPr kumimoji="0" lang="zh-CN" altLang="zh-CN" sz="1800" b="0" i="0" u="none" strike="noStrike" cap="none" normalizeH="0" baseline="0" dirty="0">
-                <a:ln>
-                  <a:noFill/>
-                </a:ln>
-                <a:solidFill>
-                  <a:srgbClr val="000000"/>
-                </a:solidFill>
-                <a:effectLst/>
-                <a:latin typeface="Consolas" panose="020B0609020204030204" pitchFamily="49" charset="0"/>
-              </a:rPr>
-            </a:br>
-            <a:r>
-              <a:rPr kumimoji="0" lang="zh-CN" altLang="zh-CN" sz="1800" b="0" i="0" u="none" strike="noStrike" cap="none" normalizeH="0" baseline="0" dirty="0">
-                <a:ln>
-                  <a:noFill/>
-                </a:ln>
-                <a:solidFill>
-                  <a:srgbClr val="000000"/>
-                </a:solidFill>
-                <a:effectLst/>
-                <a:latin typeface="Consolas" panose="020B0609020204030204" pitchFamily="49" charset="0"/>
-              </a:rPr>
-              <a:t>        setContentView(R.layout.</a:t>
-            </a:r>
-            <a:r>
-              <a:rPr kumimoji="0" lang="zh-CN" altLang="zh-CN" sz="1800" b="1" i="1" u="none" strike="noStrike" cap="none" normalizeH="0" baseline="0" dirty="0">
-                <a:ln>
-                  <a:noFill/>
-                </a:ln>
-                <a:solidFill>
-                  <a:srgbClr val="660E7A"/>
-                </a:solidFill>
-                <a:effectLst/>
-                <a:latin typeface="Consolas" panose="020B0609020204030204" pitchFamily="49" charset="0"/>
-              </a:rPr>
-              <a:t>activity_main</a:t>
-            </a:r>
-            <a:r>
-              <a:rPr kumimoji="0" lang="zh-CN" altLang="zh-CN" sz="1800" b="0" i="0" u="none" strike="noStrike" cap="none" normalizeH="0" baseline="0" dirty="0">
-                <a:ln>
-                  <a:noFill/>
-                </a:ln>
-                <a:solidFill>
-                  <a:srgbClr val="000000"/>
-                </a:solidFill>
-                <a:effectLst/>
-                <a:latin typeface="Consolas" panose="020B0609020204030204" pitchFamily="49" charset="0"/>
-              </a:rPr>
-              <a:t>);</a:t>
-            </a:r>
-            <a:br>
-              <a:rPr kumimoji="0" lang="zh-CN" altLang="zh-CN" sz="1800" b="0" i="0" u="none" strike="noStrike" cap="none" normalizeH="0" baseline="0" dirty="0">
-                <a:ln>
-                  <a:noFill/>
-                </a:ln>
-                <a:solidFill>
-                  <a:srgbClr val="000000"/>
-                </a:solidFill>
-                <a:effectLst/>
-                <a:latin typeface="Consolas" panose="020B0609020204030204" pitchFamily="49" charset="0"/>
-              </a:rPr>
-            </a:br>
-            <a:r>
-              <a:rPr kumimoji="0" lang="zh-CN" altLang="zh-CN" sz="1800" b="0" i="0" u="none" strike="noStrike" cap="none" normalizeH="0" baseline="0" dirty="0">
-                <a:ln>
-                  <a:noFill/>
-                </a:ln>
-                <a:solidFill>
-                  <a:srgbClr val="000000"/>
-                </a:solidFill>
-                <a:effectLst/>
-                <a:latin typeface="Consolas" panose="020B0609020204030204" pitchFamily="49" charset="0"/>
-              </a:rPr>
-              <a:t>        Button button = (Button) findViewById(R.id.</a:t>
-            </a:r>
-            <a:r>
-              <a:rPr kumimoji="0" lang="zh-CN" altLang="zh-CN" sz="1800" b="1" i="1" u="none" strike="noStrike" cap="none" normalizeH="0" baseline="0" dirty="0">
-                <a:ln>
-                  <a:noFill/>
-                </a:ln>
-                <a:solidFill>
-                  <a:srgbClr val="660E7A"/>
-                </a:solidFill>
-                <a:effectLst/>
-                <a:latin typeface="Consolas" panose="020B0609020204030204" pitchFamily="49" charset="0"/>
-              </a:rPr>
-              <a:t>button</a:t>
-            </a:r>
-            <a:r>
-              <a:rPr kumimoji="0" lang="zh-CN" altLang="zh-CN" sz="1800" b="0" i="0" u="none" strike="noStrike" cap="none" normalizeH="0" baseline="0" dirty="0">
-                <a:ln>
-                  <a:noFill/>
-                </a:ln>
-                <a:solidFill>
-                  <a:srgbClr val="000000"/>
-                </a:solidFill>
-                <a:effectLst/>
-                <a:latin typeface="Consolas" panose="020B0609020204030204" pitchFamily="49" charset="0"/>
-              </a:rPr>
-              <a:t>);</a:t>
-            </a:r>
-            <a:br>
-              <a:rPr kumimoji="0" lang="zh-CN" altLang="zh-CN" sz="1800" b="0" i="0" u="none" strike="noStrike" cap="none" normalizeH="0" baseline="0" dirty="0">
-                <a:ln>
-                  <a:noFill/>
-                </a:ln>
-                <a:solidFill>
-                  <a:srgbClr val="000000"/>
-                </a:solidFill>
-                <a:effectLst/>
-                <a:latin typeface="Consolas" panose="020B0609020204030204" pitchFamily="49" charset="0"/>
-              </a:rPr>
-            </a:br>
-            <a:r>
-              <a:rPr kumimoji="0" lang="zh-CN" altLang="zh-CN" sz="1800" b="0" i="0" u="none" strike="noStrike" cap="none" normalizeH="0" baseline="0" dirty="0">
-                <a:ln>
-                  <a:noFill/>
-                </a:ln>
-                <a:solidFill>
-                  <a:srgbClr val="000000"/>
-                </a:solidFill>
-                <a:effectLst/>
-                <a:latin typeface="Consolas" panose="020B0609020204030204" pitchFamily="49" charset="0"/>
-              </a:rPr>
-              <a:t>        button.setOnClickListener(</a:t>
-            </a:r>
-            <a:r>
-              <a:rPr kumimoji="0" lang="zh-CN" altLang="zh-CN" sz="1800" b="1" i="0" u="none" strike="noStrike" cap="none" normalizeH="0" baseline="0" dirty="0">
-                <a:ln>
-                  <a:noFill/>
-                </a:ln>
-                <a:solidFill>
-                  <a:srgbClr val="000080"/>
-                </a:solidFill>
-                <a:effectLst/>
-                <a:latin typeface="Consolas" panose="020B0609020204030204" pitchFamily="49" charset="0"/>
-              </a:rPr>
-              <a:t>new </a:t>
-            </a:r>
-            <a:r>
-              <a:rPr kumimoji="0" lang="zh-CN" altLang="zh-CN" sz="1800" b="0" i="0" u="none" strike="noStrike" cap="none" normalizeH="0" baseline="0" dirty="0">
-                <a:ln>
-                  <a:noFill/>
-                </a:ln>
-                <a:solidFill>
-                  <a:srgbClr val="000000"/>
-                </a:solidFill>
-                <a:effectLst/>
-                <a:latin typeface="Consolas" panose="020B0609020204030204" pitchFamily="49" charset="0"/>
-              </a:rPr>
-              <a:t>LabelClickListener());  </a:t>
-            </a:r>
-            <a:r>
-              <a:rPr kumimoji="0" lang="zh-CN" altLang="zh-CN" sz="1800" b="0" i="1" u="none" strike="noStrike" cap="none" normalizeH="0" baseline="0" dirty="0">
-                <a:ln>
-                  <a:noFill/>
-                </a:ln>
-                <a:solidFill>
-                  <a:srgbClr val="808080"/>
-                </a:solidFill>
-                <a:effectLst/>
-                <a:latin typeface="Consolas" panose="020B0609020204030204" pitchFamily="49" charset="0"/>
-              </a:rPr>
-              <a:t>// method 1</a:t>
-            </a:r>
-            <a:br>
-              <a:rPr kumimoji="0" lang="zh-CN" altLang="zh-CN" sz="1800" b="0" i="1" u="none" strike="noStrike" cap="none" normalizeH="0" baseline="0" dirty="0">
-                <a:ln>
-                  <a:noFill/>
-                </a:ln>
-                <a:solidFill>
-                  <a:srgbClr val="808080"/>
-                </a:solidFill>
-                <a:effectLst/>
-                <a:latin typeface="Consolas" panose="020B0609020204030204" pitchFamily="49" charset="0"/>
-              </a:rPr>
-            </a:br>
-            <a:r>
-              <a:rPr kumimoji="0" lang="zh-CN" altLang="zh-CN" sz="1800" b="0" i="1" u="none" strike="noStrike" cap="none" normalizeH="0" baseline="0" dirty="0">
-                <a:ln>
-                  <a:noFill/>
-                </a:ln>
-                <a:solidFill>
-                  <a:srgbClr val="808080"/>
-                </a:solidFill>
-                <a:effectLst/>
-                <a:latin typeface="Consolas" panose="020B0609020204030204" pitchFamily="49" charset="0"/>
-              </a:rPr>
-              <a:t>        </a:t>
-            </a:r>
-            <a:r>
-              <a:rPr kumimoji="0" lang="zh-CN" altLang="zh-CN" sz="1800" b="0" i="0" u="none" strike="noStrike" cap="none" normalizeH="0" baseline="0" dirty="0">
-                <a:ln>
-                  <a:noFill/>
-                </a:ln>
-                <a:solidFill>
-                  <a:srgbClr val="000000"/>
-                </a:solidFill>
-                <a:effectLst/>
-                <a:latin typeface="Consolas" panose="020B0609020204030204" pitchFamily="49" charset="0"/>
-              </a:rPr>
-              <a:t>button.setOnClickListener(</a:t>
-            </a:r>
-            <a:r>
-              <a:rPr kumimoji="0" lang="zh-CN" altLang="zh-CN" sz="1800" b="1" i="0" u="none" strike="noStrike" cap="none" normalizeH="0" baseline="0" dirty="0">
-                <a:ln>
-                  <a:noFill/>
-                </a:ln>
-                <a:solidFill>
-                  <a:srgbClr val="000080"/>
-                </a:solidFill>
-                <a:effectLst/>
-                <a:latin typeface="Consolas" panose="020B0609020204030204" pitchFamily="49" charset="0"/>
-              </a:rPr>
-              <a:t>new </a:t>
-            </a:r>
-            <a:r>
-              <a:rPr kumimoji="0" lang="zh-CN" altLang="zh-CN" sz="1800" b="0" i="0" u="none" strike="noStrike" cap="none" normalizeH="0" baseline="0" dirty="0">
-                <a:ln>
-                  <a:noFill/>
-                </a:ln>
-                <a:solidFill>
-                  <a:srgbClr val="000000"/>
-                </a:solidFill>
-                <a:effectLst/>
-                <a:latin typeface="Consolas" panose="020B0609020204030204" pitchFamily="49" charset="0"/>
-              </a:rPr>
-              <a:t>View.OnClickListener() {</a:t>
-            </a:r>
-            <a:br>
-              <a:rPr kumimoji="0" lang="zh-CN" altLang="zh-CN" sz="1800" b="0" i="0" u="none" strike="noStrike" cap="none" normalizeH="0" baseline="0" dirty="0">
-                <a:ln>
-                  <a:noFill/>
-                </a:ln>
-                <a:solidFill>
-                  <a:srgbClr val="000000"/>
-                </a:solidFill>
-                <a:effectLst/>
-                <a:latin typeface="Consolas" panose="020B0609020204030204" pitchFamily="49" charset="0"/>
-              </a:rPr>
-            </a:br>
-            <a:r>
-              <a:rPr kumimoji="0" lang="zh-CN" altLang="zh-CN" sz="1800" b="0" i="0" u="none" strike="noStrike" cap="none" normalizeH="0" baseline="0" dirty="0">
-                <a:ln>
-                  <a:noFill/>
-                </a:ln>
-                <a:solidFill>
-                  <a:srgbClr val="000000"/>
-                </a:solidFill>
-                <a:effectLst/>
-                <a:latin typeface="Consolas" panose="020B0609020204030204" pitchFamily="49" charset="0"/>
-              </a:rPr>
-              <a:t>            </a:t>
-            </a:r>
-            <a:r>
-              <a:rPr kumimoji="0" lang="zh-CN" altLang="zh-CN" sz="1800" b="0" i="0" u="none" strike="noStrike" cap="none" normalizeH="0" baseline="0" dirty="0">
-                <a:ln>
-                  <a:noFill/>
-                </a:ln>
-                <a:solidFill>
-                  <a:srgbClr val="808000"/>
-                </a:solidFill>
-                <a:effectLst/>
-                <a:latin typeface="Consolas" panose="020B0609020204030204" pitchFamily="49" charset="0"/>
-              </a:rPr>
-              <a:t>@Override</a:t>
-            </a:r>
-            <a:br>
-              <a:rPr kumimoji="0" lang="zh-CN" altLang="zh-CN" sz="1800" b="0" i="0" u="none" strike="noStrike" cap="none" normalizeH="0" baseline="0" dirty="0">
-                <a:ln>
-                  <a:noFill/>
-                </a:ln>
-                <a:solidFill>
-                  <a:srgbClr val="808000"/>
-                </a:solidFill>
-                <a:effectLst/>
-                <a:latin typeface="Consolas" panose="020B0609020204030204" pitchFamily="49" charset="0"/>
-              </a:rPr>
-            </a:br>
-            <a:r>
-              <a:rPr kumimoji="0" lang="zh-CN" altLang="zh-CN" sz="1800" b="0" i="0" u="none" strike="noStrike" cap="none" normalizeH="0" baseline="0" dirty="0">
-                <a:ln>
-                  <a:noFill/>
-                </a:ln>
-                <a:solidFill>
-                  <a:srgbClr val="808000"/>
-                </a:solidFill>
-                <a:effectLst/>
-                <a:latin typeface="Consolas" panose="020B0609020204030204" pitchFamily="49" charset="0"/>
-              </a:rPr>
-              <a:t>            </a:t>
-            </a:r>
-            <a:r>
-              <a:rPr kumimoji="0" lang="zh-CN" altLang="zh-CN" sz="1800" b="1" i="0" u="none" strike="noStrike" cap="none" normalizeH="0" baseline="0" dirty="0">
-                <a:ln>
-                  <a:noFill/>
-                </a:ln>
-                <a:solidFill>
-                  <a:srgbClr val="000080"/>
-                </a:solidFill>
-                <a:effectLst/>
-                <a:latin typeface="Consolas" panose="020B0609020204030204" pitchFamily="49" charset="0"/>
-              </a:rPr>
-              <a:t>public void </a:t>
-            </a:r>
-            <a:r>
-              <a:rPr kumimoji="0" lang="zh-CN" altLang="zh-CN" sz="1800" b="0" i="0" u="none" strike="noStrike" cap="none" normalizeH="0" baseline="0" dirty="0">
-                <a:ln>
-                  <a:noFill/>
-                </a:ln>
-                <a:solidFill>
-                  <a:srgbClr val="000000"/>
-                </a:solidFill>
-                <a:effectLst/>
-                <a:latin typeface="Consolas" panose="020B0609020204030204" pitchFamily="49" charset="0"/>
-              </a:rPr>
-              <a:t>onClick(View view) { }</a:t>
-            </a:r>
-            <a:br>
-              <a:rPr kumimoji="0" lang="zh-CN" altLang="zh-CN" sz="1800" b="0" i="0" u="none" strike="noStrike" cap="none" normalizeH="0" baseline="0" dirty="0">
-                <a:ln>
-                  <a:noFill/>
-                </a:ln>
-                <a:solidFill>
-                  <a:srgbClr val="000000"/>
-                </a:solidFill>
-                <a:effectLst/>
-                <a:latin typeface="Consolas" panose="020B0609020204030204" pitchFamily="49" charset="0"/>
-              </a:rPr>
-            </a:br>
-            <a:r>
-              <a:rPr kumimoji="0" lang="zh-CN" altLang="zh-CN" sz="1800" b="0" i="0" u="none" strike="noStrike" cap="none" normalizeH="0" baseline="0" dirty="0">
-                <a:ln>
-                  <a:noFill/>
-                </a:ln>
-                <a:solidFill>
-                  <a:srgbClr val="000000"/>
-                </a:solidFill>
-                <a:effectLst/>
-                <a:latin typeface="Consolas" panose="020B0609020204030204" pitchFamily="49" charset="0"/>
-              </a:rPr>
-              <a:t>        });    </a:t>
-            </a:r>
-            <a:r>
-              <a:rPr kumimoji="0" lang="zh-CN" altLang="zh-CN" sz="1800" b="0" i="1" u="none" strike="noStrike" cap="none" normalizeH="0" baseline="0" dirty="0">
-                <a:ln>
-                  <a:noFill/>
-                </a:ln>
-                <a:solidFill>
-                  <a:srgbClr val="808080"/>
-                </a:solidFill>
-                <a:effectLst/>
-                <a:latin typeface="Consolas" panose="020B0609020204030204" pitchFamily="49" charset="0"/>
-              </a:rPr>
-              <a:t>// method 2</a:t>
-            </a:r>
-            <a:br>
-              <a:rPr kumimoji="0" lang="zh-CN" altLang="zh-CN" sz="1800" b="0" i="1" u="none" strike="noStrike" cap="none" normalizeH="0" baseline="0" dirty="0">
-                <a:ln>
-                  <a:noFill/>
-                </a:ln>
-                <a:solidFill>
-                  <a:srgbClr val="808080"/>
-                </a:solidFill>
-                <a:effectLst/>
-                <a:latin typeface="Consolas" panose="020B0609020204030204" pitchFamily="49" charset="0"/>
-              </a:rPr>
-            </a:br>
-            <a:r>
-              <a:rPr kumimoji="0" lang="zh-CN" altLang="zh-CN" sz="1800" b="0" i="1" u="none" strike="noStrike" cap="none" normalizeH="0" baseline="0" dirty="0">
-                <a:ln>
-                  <a:noFill/>
-                </a:ln>
-                <a:solidFill>
-                  <a:srgbClr val="808080"/>
-                </a:solidFill>
-                <a:effectLst/>
-                <a:latin typeface="Consolas" panose="020B0609020204030204" pitchFamily="49" charset="0"/>
-              </a:rPr>
-              <a:t>    </a:t>
-            </a:r>
-            <a:r>
-              <a:rPr kumimoji="0" lang="zh-CN" altLang="zh-CN" sz="1800" b="0" i="0" u="none" strike="noStrike" cap="none" normalizeH="0" baseline="0" dirty="0">
-                <a:ln>
-                  <a:noFill/>
-                </a:ln>
-                <a:solidFill>
-                  <a:srgbClr val="000000"/>
-                </a:solidFill>
-                <a:effectLst/>
-                <a:latin typeface="Consolas" panose="020B0609020204030204" pitchFamily="49" charset="0"/>
-              </a:rPr>
-              <a:t>}</a:t>
-            </a:r>
-            <a:br>
-              <a:rPr kumimoji="0" lang="zh-CN" altLang="zh-CN" sz="1800" b="0" i="0" u="none" strike="noStrike" cap="none" normalizeH="0" baseline="0" dirty="0">
-                <a:ln>
-                  <a:noFill/>
-                </a:ln>
-                <a:solidFill>
-                  <a:srgbClr val="000000"/>
-                </a:solidFill>
-                <a:effectLst/>
-                <a:latin typeface="Consolas" panose="020B0609020204030204" pitchFamily="49" charset="0"/>
-              </a:rPr>
-            </a:br>
-            <a:br>
-              <a:rPr kumimoji="0" lang="zh-CN" altLang="zh-CN" sz="1800" b="0" i="0" u="none" strike="noStrike" cap="none" normalizeH="0" baseline="0" dirty="0">
-                <a:ln>
-                  <a:noFill/>
-                </a:ln>
-                <a:solidFill>
-                  <a:srgbClr val="000000"/>
-                </a:solidFill>
-                <a:effectLst/>
-                <a:latin typeface="Consolas" panose="020B0609020204030204" pitchFamily="49" charset="0"/>
-              </a:rPr>
-            </a:br>
-            <a:r>
-              <a:rPr kumimoji="0" lang="zh-CN" altLang="zh-CN" sz="1800" b="0" i="0" u="none" strike="noStrike" cap="none" normalizeH="0" baseline="0" dirty="0">
-                <a:ln>
-                  <a:noFill/>
-                </a:ln>
-                <a:solidFill>
-                  <a:srgbClr val="000000"/>
-                </a:solidFill>
-                <a:effectLst/>
-                <a:latin typeface="Consolas" panose="020B0609020204030204" pitchFamily="49" charset="0"/>
-              </a:rPr>
-              <a:t>    </a:t>
-            </a:r>
-            <a:r>
-              <a:rPr kumimoji="0" lang="zh-CN" altLang="zh-CN" sz="1800" b="1" i="0" u="none" strike="noStrike" cap="none" normalizeH="0" baseline="0" dirty="0">
-                <a:ln>
-                  <a:noFill/>
-                </a:ln>
-                <a:solidFill>
-                  <a:srgbClr val="000080"/>
-                </a:solidFill>
-                <a:effectLst/>
-                <a:latin typeface="Consolas" panose="020B0609020204030204" pitchFamily="49" charset="0"/>
-              </a:rPr>
-              <a:t>class </a:t>
-            </a:r>
-            <a:r>
-              <a:rPr kumimoji="0" lang="zh-CN" altLang="zh-CN" sz="1800" b="0" i="0" u="none" strike="noStrike" cap="none" normalizeH="0" baseline="0" dirty="0">
-                <a:ln>
-                  <a:noFill/>
-                </a:ln>
-                <a:solidFill>
-                  <a:srgbClr val="000000"/>
-                </a:solidFill>
-                <a:effectLst/>
-                <a:latin typeface="Consolas" panose="020B0609020204030204" pitchFamily="49" charset="0"/>
-              </a:rPr>
-              <a:t>LabelClickListener </a:t>
-            </a:r>
-            <a:r>
-              <a:rPr kumimoji="0" lang="zh-CN" altLang="zh-CN" sz="1800" b="1" i="0" u="none" strike="noStrike" cap="none" normalizeH="0" baseline="0" dirty="0">
-                <a:ln>
-                  <a:noFill/>
-                </a:ln>
-                <a:solidFill>
-                  <a:srgbClr val="000080"/>
-                </a:solidFill>
-                <a:effectLst/>
-                <a:latin typeface="Consolas" panose="020B0609020204030204" pitchFamily="49" charset="0"/>
-              </a:rPr>
-              <a:t>implements  </a:t>
-            </a:r>
-            <a:r>
-              <a:rPr kumimoji="0" lang="zh-CN" altLang="zh-CN" sz="1800" b="0" i="0" u="none" strike="noStrike" cap="none" normalizeH="0" baseline="0" dirty="0">
-                <a:ln>
-                  <a:noFill/>
-                </a:ln>
-                <a:solidFill>
-                  <a:srgbClr val="000000"/>
-                </a:solidFill>
-                <a:effectLst/>
-                <a:latin typeface="Consolas" panose="020B0609020204030204" pitchFamily="49" charset="0"/>
-              </a:rPr>
-              <a:t>View.OnClickListener</a:t>
-            </a:r>
-            <a:br>
-              <a:rPr kumimoji="0" lang="zh-CN" altLang="zh-CN" sz="1800" b="0" i="0" u="none" strike="noStrike" cap="none" normalizeH="0" baseline="0" dirty="0">
-                <a:ln>
-                  <a:noFill/>
-                </a:ln>
-                <a:solidFill>
-                  <a:srgbClr val="000000"/>
-                </a:solidFill>
-                <a:effectLst/>
-                <a:latin typeface="Consolas" panose="020B0609020204030204" pitchFamily="49" charset="0"/>
-              </a:rPr>
-            </a:br>
-            <a:r>
-              <a:rPr kumimoji="0" lang="zh-CN" altLang="zh-CN" sz="1800" b="0" i="0" u="none" strike="noStrike" cap="none" normalizeH="0" baseline="0" dirty="0">
-                <a:ln>
-                  <a:noFill/>
-                </a:ln>
-                <a:solidFill>
-                  <a:srgbClr val="000000"/>
-                </a:solidFill>
-                <a:effectLst/>
-                <a:latin typeface="Consolas" panose="020B0609020204030204" pitchFamily="49" charset="0"/>
-              </a:rPr>
-              <a:t>    {</a:t>
-            </a:r>
-            <a:br>
-              <a:rPr kumimoji="0" lang="zh-CN" altLang="zh-CN" sz="1800" b="0" i="0" u="none" strike="noStrike" cap="none" normalizeH="0" baseline="0" dirty="0">
-                <a:ln>
-                  <a:noFill/>
-                </a:ln>
-                <a:solidFill>
-                  <a:srgbClr val="000000"/>
-                </a:solidFill>
-                <a:effectLst/>
-                <a:latin typeface="Consolas" panose="020B0609020204030204" pitchFamily="49" charset="0"/>
-              </a:rPr>
-            </a:br>
-            <a:r>
-              <a:rPr kumimoji="0" lang="zh-CN" altLang="zh-CN" sz="1800" b="0" i="0" u="none" strike="noStrike" cap="none" normalizeH="0" baseline="0" dirty="0">
-                <a:ln>
-                  <a:noFill/>
-                </a:ln>
-                <a:solidFill>
-                  <a:srgbClr val="000000"/>
-                </a:solidFill>
-                <a:effectLst/>
-                <a:latin typeface="Consolas" panose="020B0609020204030204" pitchFamily="49" charset="0"/>
-              </a:rPr>
-              <a:t>        </a:t>
-            </a:r>
-            <a:r>
-              <a:rPr kumimoji="0" lang="zh-CN" altLang="zh-CN" sz="1800" b="0" i="0" u="none" strike="noStrike" cap="none" normalizeH="0" baseline="0" dirty="0">
-                <a:ln>
-                  <a:noFill/>
-                </a:ln>
-                <a:solidFill>
-                  <a:srgbClr val="808000"/>
-                </a:solidFill>
-                <a:effectLst/>
-                <a:latin typeface="Consolas" panose="020B0609020204030204" pitchFamily="49" charset="0"/>
-              </a:rPr>
-              <a:t>@Override</a:t>
-            </a:r>
-            <a:br>
-              <a:rPr kumimoji="0" lang="zh-CN" altLang="zh-CN" sz="1800" b="0" i="0" u="none" strike="noStrike" cap="none" normalizeH="0" baseline="0" dirty="0">
-                <a:ln>
-                  <a:noFill/>
-                </a:ln>
-                <a:solidFill>
-                  <a:srgbClr val="808000"/>
-                </a:solidFill>
-                <a:effectLst/>
-                <a:latin typeface="Consolas" panose="020B0609020204030204" pitchFamily="49" charset="0"/>
-              </a:rPr>
-            </a:br>
-            <a:r>
-              <a:rPr kumimoji="0" lang="zh-CN" altLang="zh-CN" sz="1800" b="0" i="0" u="none" strike="noStrike" cap="none" normalizeH="0" baseline="0" dirty="0">
-                <a:ln>
-                  <a:noFill/>
-                </a:ln>
-                <a:solidFill>
-                  <a:srgbClr val="808000"/>
-                </a:solidFill>
-                <a:effectLst/>
-                <a:latin typeface="Consolas" panose="020B0609020204030204" pitchFamily="49" charset="0"/>
-              </a:rPr>
-              <a:t>        </a:t>
-            </a:r>
-            <a:r>
-              <a:rPr kumimoji="0" lang="zh-CN" altLang="zh-CN" sz="1800" b="1" i="0" u="none" strike="noStrike" cap="none" normalizeH="0" baseline="0" dirty="0">
-                <a:ln>
-                  <a:noFill/>
-                </a:ln>
-                <a:solidFill>
-                  <a:srgbClr val="000080"/>
-                </a:solidFill>
-                <a:effectLst/>
-                <a:latin typeface="Consolas" panose="020B0609020204030204" pitchFamily="49" charset="0"/>
-              </a:rPr>
-              <a:t>public  void </a:t>
-            </a:r>
-            <a:r>
-              <a:rPr kumimoji="0" lang="zh-CN" altLang="zh-CN" sz="1800" b="0" i="0" u="none" strike="noStrike" cap="none" normalizeH="0" baseline="0" dirty="0">
-                <a:ln>
-                  <a:noFill/>
-                </a:ln>
-                <a:solidFill>
-                  <a:srgbClr val="000000"/>
-                </a:solidFill>
-                <a:effectLst/>
-                <a:latin typeface="Consolas" panose="020B0609020204030204" pitchFamily="49" charset="0"/>
-              </a:rPr>
-              <a:t>onClick(View v){ }</a:t>
-            </a:r>
-            <a:br>
-              <a:rPr kumimoji="0" lang="zh-CN" altLang="zh-CN" sz="1800" b="0" i="0" u="none" strike="noStrike" cap="none" normalizeH="0" baseline="0" dirty="0">
-                <a:ln>
-                  <a:noFill/>
-                </a:ln>
-                <a:solidFill>
-                  <a:srgbClr val="000000"/>
-                </a:solidFill>
-                <a:effectLst/>
-                <a:latin typeface="Consolas" panose="020B0609020204030204" pitchFamily="49" charset="0"/>
-              </a:rPr>
-            </a:br>
-            <a:r>
-              <a:rPr kumimoji="0" lang="zh-CN" altLang="zh-CN" sz="1800" b="0" i="0" u="none" strike="noStrike" cap="none" normalizeH="0" baseline="0" dirty="0">
-                <a:ln>
-                  <a:noFill/>
-                </a:ln>
-                <a:solidFill>
-                  <a:srgbClr val="000000"/>
-                </a:solidFill>
-                <a:effectLst/>
-                <a:latin typeface="Consolas" panose="020B0609020204030204" pitchFamily="49" charset="0"/>
-              </a:rPr>
-              <a:t>    }</a:t>
-            </a:r>
-            <a:br>
-              <a:rPr kumimoji="0" lang="zh-CN" altLang="zh-CN" sz="1800" b="0" i="0" u="none" strike="noStrike" cap="none" normalizeH="0" baseline="0" dirty="0">
-                <a:ln>
-                  <a:noFill/>
-                </a:ln>
-                <a:solidFill>
-                  <a:srgbClr val="000000"/>
-                </a:solidFill>
-                <a:effectLst/>
-                <a:latin typeface="Consolas" panose="020B0609020204030204" pitchFamily="49" charset="0"/>
-              </a:rPr>
-            </a:br>
-            <a:br>
-              <a:rPr kumimoji="0" lang="zh-CN" altLang="zh-CN" sz="1800" b="0" i="0" u="none" strike="noStrike" cap="none" normalizeH="0" baseline="0" dirty="0">
-                <a:ln>
-                  <a:noFill/>
-                </a:ln>
-                <a:solidFill>
-                  <a:srgbClr val="000000"/>
-                </a:solidFill>
-                <a:effectLst/>
-                <a:latin typeface="Consolas" panose="020B0609020204030204" pitchFamily="49" charset="0"/>
-              </a:rPr>
-            </a:br>
-            <a:r>
-              <a:rPr kumimoji="0" lang="zh-CN" altLang="zh-CN" sz="1800" b="0" i="0" u="none" strike="noStrike" cap="none" normalizeH="0" baseline="0" dirty="0">
-                <a:ln>
-                  <a:noFill/>
-                </a:ln>
-                <a:solidFill>
-                  <a:srgbClr val="000000"/>
-                </a:solidFill>
-                <a:effectLst/>
-                <a:latin typeface="Consolas" panose="020B0609020204030204" pitchFamily="49" charset="0"/>
-              </a:rPr>
-              <a:t>    </a:t>
-            </a:r>
-            <a:r>
-              <a:rPr kumimoji="0" lang="zh-CN" altLang="zh-CN" sz="1800" b="1" i="0" u="none" strike="noStrike" cap="none" normalizeH="0" baseline="0" dirty="0">
-                <a:ln>
-                  <a:noFill/>
-                </a:ln>
-                <a:solidFill>
-                  <a:srgbClr val="000080"/>
-                </a:solidFill>
-                <a:effectLst/>
-                <a:latin typeface="Consolas" panose="020B0609020204030204" pitchFamily="49" charset="0"/>
-              </a:rPr>
-              <a:t>public void </a:t>
-            </a:r>
-            <a:r>
-              <a:rPr kumimoji="0" lang="zh-CN" altLang="zh-CN" sz="1800" b="0" i="0" u="none" strike="noStrike" cap="none" normalizeH="0" baseline="0" dirty="0">
-                <a:ln>
-                  <a:noFill/>
-                </a:ln>
-                <a:solidFill>
-                  <a:srgbClr val="000000"/>
-                </a:solidFill>
-                <a:effectLst/>
-                <a:latin typeface="Consolas" panose="020B0609020204030204" pitchFamily="49" charset="0"/>
-              </a:rPr>
-              <a:t>labelOnclick(View v){}   </a:t>
-            </a:r>
-            <a:r>
-              <a:rPr kumimoji="0" lang="zh-CN" altLang="zh-CN" sz="1800" b="0" i="1" u="none" strike="noStrike" cap="none" normalizeH="0" baseline="0" dirty="0">
-                <a:ln>
-                  <a:noFill/>
-                </a:ln>
-                <a:solidFill>
-                  <a:srgbClr val="808080"/>
-                </a:solidFill>
-                <a:effectLst/>
-                <a:latin typeface="Consolas" panose="020B0609020204030204" pitchFamily="49" charset="0"/>
-              </a:rPr>
-              <a:t>// method 3</a:t>
-            </a:r>
-            <a:br>
-              <a:rPr kumimoji="0" lang="zh-CN" altLang="zh-CN" sz="1800" b="0" i="1" u="none" strike="noStrike" cap="none" normalizeH="0" baseline="0" dirty="0">
-                <a:ln>
-                  <a:noFill/>
-                </a:ln>
-                <a:solidFill>
-                  <a:srgbClr val="808080"/>
-                </a:solidFill>
-                <a:effectLst/>
-                <a:latin typeface="Consolas" panose="020B0609020204030204" pitchFamily="49" charset="0"/>
-              </a:rPr>
-            </a:br>
-            <a:r>
-              <a:rPr kumimoji="0" lang="zh-CN" altLang="zh-CN" sz="1800" b="0" i="0" u="none" strike="noStrike" cap="none" normalizeH="0" baseline="0" dirty="0">
-                <a:ln>
-                  <a:noFill/>
-                </a:ln>
-                <a:solidFill>
-                  <a:srgbClr val="000000"/>
-                </a:solidFill>
-                <a:effectLst/>
-                <a:latin typeface="Consolas" panose="020B0609020204030204" pitchFamily="49" charset="0"/>
-              </a:rPr>
-              <a:t>}  </a:t>
-            </a:r>
-            <a:r>
-              <a:rPr kumimoji="0" lang="zh-CN" altLang="zh-CN" sz="1800" b="0" i="1" u="none" strike="noStrike" cap="none" normalizeH="0" baseline="0" dirty="0">
-                <a:ln>
-                  <a:noFill/>
-                </a:ln>
-                <a:solidFill>
-                  <a:srgbClr val="808080"/>
-                </a:solidFill>
-                <a:effectLst/>
-                <a:latin typeface="Consolas" panose="020B0609020204030204" pitchFamily="49" charset="0"/>
-              </a:rPr>
-              <a:t>// end of MainActivity</a:t>
-            </a:r>
-            <a:endParaRPr kumimoji="0" lang="zh-CN" altLang="zh-CN" sz="1800" b="0" i="0" u="none" strike="noStrike" cap="none" normalizeH="0" baseline="0" dirty="0">
-              <a:ln>
-                <a:noFill/>
-              </a:ln>
+            <a:r>
+              <a:rPr lang="en-US" altLang="zh-CN" b="1" dirty="0">
+                <a:solidFill>
+                  <a:srgbClr val="333333"/>
+                </a:solidFill>
+                <a:latin typeface="Helvetica Neue"/>
+              </a:rPr>
+              <a:t>Dialog(</a:t>
+            </a:r>
+            <a:r>
+              <a:rPr lang="zh-CN" altLang="en-US" b="1" dirty="0">
+                <a:solidFill>
+                  <a:srgbClr val="333333"/>
+                </a:solidFill>
+                <a:latin typeface="Helvetica Neue"/>
+              </a:rPr>
+              <a:t>对话框</a:t>
+            </a:r>
+            <a:r>
+              <a:rPr lang="en-US" altLang="zh-CN" b="1" dirty="0">
+                <a:solidFill>
+                  <a:srgbClr val="333333"/>
+                </a:solidFill>
+                <a:latin typeface="Helvetica Neue"/>
+              </a:rPr>
+              <a:t>)</a:t>
+            </a:r>
+          </a:p>
+          <a:p>
+            <a:r>
+              <a:rPr lang="zh-CN" altLang="en-US" b="1" dirty="0">
+                <a:latin typeface="Roboto"/>
+              </a:rPr>
+              <a:t>资源文件</a:t>
+            </a:r>
+            <a:endParaRPr lang="zh-CN" altLang="en-US" b="1" i="0" dirty="0">
+              <a:effectLst/>
+              <a:latin typeface="Roboto"/>
+            </a:endParaRPr>
+          </a:p>
+          <a:p>
+            <a:endParaRPr lang="en-US" altLang="zh-CN" b="1" dirty="0">
               <a:solidFill>
-                <a:schemeClr val="tx1"/>
+                <a:srgbClr val="333333"/>
               </a:solidFill>
-              <a:effectLst/>
-              <a:latin typeface="Arial" panose="020B0604020202020204" pitchFamily="34" charset="0"/>
+              <a:latin typeface="Helvetica Neue"/>
+            </a:endParaRPr>
+          </a:p>
+          <a:p>
+            <a:endParaRPr lang="zh-CN" altLang="en-US" b="1" dirty="0">
+              <a:solidFill>
+                <a:srgbClr val="333333"/>
+              </a:solidFill>
+              <a:latin typeface="Helvetica Neue"/>
             </a:endParaRPr>
           </a:p>
         </p:txBody>
@@ -17290,7 +17325,7 @@
     </p:spTree>
     <p:extLst>
       <p:ext uri="{BB962C8B-B14F-4D97-AF65-F5344CB8AC3E}">
-        <p14:creationId xmlns:p14="http://schemas.microsoft.com/office/powerpoint/2010/main" val="54286833"/>
+        <p14:creationId xmlns:p14="http://schemas.microsoft.com/office/powerpoint/2010/main" val="1188796406"/>
       </p:ext>
     </p:extLst>
   </p:cSld>
@@ -22201,7 +22236,12 @@
             <p:ph idx="1"/>
           </p:nvPr>
         </p:nvSpPr>
-        <p:spPr/>
+        <p:spPr>
+          <a:xfrm>
+            <a:off x="838200" y="1586132"/>
+            <a:ext cx="10515600" cy="4351338"/>
+          </a:xfrm>
+        </p:spPr>
         <p:txBody>
           <a:bodyPr/>
           <a:lstStyle/>
@@ -22239,6 +22279,42 @@
           </a:p>
         </p:txBody>
       </p:sp>
+      <p:pic>
+        <p:nvPicPr>
+          <p:cNvPr id="5" name="图片 4">
+            <a:extLst>
+              <a:ext uri="{FF2B5EF4-FFF2-40B4-BE49-F238E27FC236}">
+                <a16:creationId xmlns:a16="http://schemas.microsoft.com/office/drawing/2014/main" id="{B01E9269-4C1F-4CB9-82FE-830ED909085E}"/>
+              </a:ext>
+            </a:extLst>
+          </p:cNvPr>
+          <p:cNvPicPr>
+            <a:picLocks noChangeAspect="1"/>
+          </p:cNvPicPr>
+          <p:nvPr/>
+        </p:nvPicPr>
+        <p:blipFill>
+          <a:blip r:embed="rId2">
+            <a:extLst>
+              <a:ext uri="{28A0092B-C50C-407E-A947-70E740481C1C}">
+                <a14:useLocalDpi xmlns:a14="http://schemas.microsoft.com/office/drawing/2010/main" val="0"/>
+              </a:ext>
+            </a:extLst>
+          </a:blip>
+          <a:stretch>
+            <a:fillRect/>
+          </a:stretch>
+        </p:blipFill>
+        <p:spPr>
+          <a:xfrm>
+            <a:off x="2616316" y="3299932"/>
+            <a:ext cx="5912492" cy="3251870"/>
+          </a:xfrm>
+          <a:prstGeom prst="rect">
+            <a:avLst/>
+          </a:prstGeom>
+        </p:spPr>
+      </p:pic>
     </p:spTree>
     <p:extLst>
       <p:ext uri="{BB962C8B-B14F-4D97-AF65-F5344CB8AC3E}">

</xml_diff>